<commit_message>
ppt of the scenario figure
</commit_message>
<xml_diff>
--- a/AAMAS Paper/scenario.pptx
+++ b/AAMAS Paper/scenario.pptx
@@ -3095,1186 +3095,1201 @@
           <a:chExt cx="0" cy="0"/>
         </a:xfrm>
       </p:grpSpPr>
-      <p:sp>
-        <p:nvSpPr>
-          <p:cNvPr id="4" name="Rounded Rectangle 3"/>
-          <p:cNvSpPr/>
+      <p:grpSp>
+        <p:nvGrpSpPr>
+          <p:cNvPr id="77" name="Group 76"/>
+          <p:cNvGrpSpPr/>
           <p:nvPr/>
-        </p:nvSpPr>
-        <p:spPr>
+        </p:nvGrpSpPr>
+        <p:grpSpPr>
           <a:xfrm>
-            <a:off x="2152700" y="634939"/>
-            <a:ext cx="1321789" cy="414655"/>
+            <a:off x="868239" y="479444"/>
+            <a:ext cx="6048181" cy="2995905"/>
+            <a:chOff x="868239" y="479444"/>
+            <a:chExt cx="6048181" cy="2995905"/>
           </a:xfrm>
-          <a:prstGeom prst="roundRect">
-            <a:avLst/>
-          </a:prstGeom>
-          <a:noFill/>
-          <a:ln>
-            <a:solidFill>
-              <a:schemeClr val="tx1"/>
-            </a:solidFill>
-          </a:ln>
-          <a:effectLst/>
-        </p:spPr>
-        <p:style>
-          <a:lnRef idx="1">
-            <a:schemeClr val="accent1"/>
-          </a:lnRef>
-          <a:fillRef idx="3">
-            <a:schemeClr val="accent1"/>
-          </a:fillRef>
-          <a:effectRef idx="2">
-            <a:schemeClr val="accent1"/>
-          </a:effectRef>
-          <a:fontRef idx="minor">
-            <a:schemeClr val="lt1"/>
-          </a:fontRef>
-        </p:style>
-        <p:txBody>
-          <a:bodyPr rtlCol="0" anchor="ctr"/>
-          <a:lstStyle/>
-          <a:p>
-            <a:pPr algn="ctr"/>
-            <a:r>
-              <a:rPr lang="en-US" sz="1200" dirty="0" smtClean="0">
+        </p:grpSpPr>
+        <p:sp>
+          <p:nvSpPr>
+            <p:cNvPr id="4" name="Rounded Rectangle 3"/>
+            <p:cNvSpPr/>
+            <p:nvPr/>
+          </p:nvSpPr>
+          <p:spPr>
+            <a:xfrm>
+              <a:off x="2152700" y="634939"/>
+              <a:ext cx="1321789" cy="414655"/>
+            </a:xfrm>
+            <a:prstGeom prst="roundRect">
+              <a:avLst/>
+            </a:prstGeom>
+            <a:noFill/>
+            <a:ln>
+              <a:solidFill>
+                <a:schemeClr val="tx1"/>
+              </a:solidFill>
+            </a:ln>
+            <a:effectLst/>
+          </p:spPr>
+          <p:style>
+            <a:lnRef idx="1">
+              <a:schemeClr val="accent1"/>
+            </a:lnRef>
+            <a:fillRef idx="3">
+              <a:schemeClr val="accent1"/>
+            </a:fillRef>
+            <a:effectRef idx="2">
+              <a:schemeClr val="accent1"/>
+            </a:effectRef>
+            <a:fontRef idx="minor">
+              <a:schemeClr val="lt1"/>
+            </a:fontRef>
+          </p:style>
+          <p:txBody>
+            <a:bodyPr rtlCol="0" anchor="ctr"/>
+            <a:lstStyle/>
+            <a:p>
+              <a:pPr algn="ctr"/>
+              <a:r>
+                <a:rPr lang="en-US" sz="1200" dirty="0" smtClean="0">
+                  <a:solidFill>
+                    <a:srgbClr val="000000"/>
+                  </a:solidFill>
+                </a:rPr>
+                <a:t>Human Coordinator</a:t>
+              </a:r>
+              <a:endParaRPr lang="en-US" sz="1200" dirty="0">
                 <a:solidFill>
                   <a:srgbClr val="000000"/>
                 </a:solidFill>
-              </a:rPr>
-              <a:t>Human Coordinator</a:t>
-            </a:r>
-            <a:endParaRPr lang="en-US" sz="1200" dirty="0">
+              </a:endParaRPr>
+            </a:p>
+          </p:txBody>
+        </p:sp>
+        <p:sp>
+          <p:nvSpPr>
+            <p:cNvPr id="5" name="Rounded Rectangle 4"/>
+            <p:cNvSpPr/>
+            <p:nvPr/>
+          </p:nvSpPr>
+          <p:spPr>
+            <a:xfrm>
+              <a:off x="2152700" y="1801156"/>
+              <a:ext cx="1321789" cy="398602"/>
+            </a:xfrm>
+            <a:prstGeom prst="roundRect">
+              <a:avLst/>
+            </a:prstGeom>
+            <a:noFill/>
+            <a:ln>
+              <a:solidFill>
+                <a:schemeClr val="tx1"/>
+              </a:solidFill>
+              <a:prstDash val="dash"/>
+            </a:ln>
+            <a:effectLst/>
+          </p:spPr>
+          <p:style>
+            <a:lnRef idx="1">
+              <a:schemeClr val="accent1"/>
+            </a:lnRef>
+            <a:fillRef idx="3">
+              <a:schemeClr val="accent1"/>
+            </a:fillRef>
+            <a:effectRef idx="2">
+              <a:schemeClr val="accent1"/>
+            </a:effectRef>
+            <a:fontRef idx="minor">
+              <a:schemeClr val="lt1"/>
+            </a:fontRef>
+          </p:style>
+          <p:txBody>
+            <a:bodyPr rtlCol="0" anchor="ctr"/>
+            <a:lstStyle/>
+            <a:p>
+              <a:pPr algn="ctr"/>
+              <a:r>
+                <a:rPr lang="en-US" sz="1400" dirty="0" smtClean="0">
+                  <a:solidFill>
+                    <a:srgbClr val="000000"/>
+                  </a:solidFill>
+                </a:rPr>
+                <a:t>Planner Agent</a:t>
+              </a:r>
+              <a:endParaRPr lang="en-US" sz="1400" dirty="0">
+                <a:solidFill>
+                  <a:srgbClr val="000000"/>
+                </a:solidFill>
+              </a:endParaRPr>
+            </a:p>
+          </p:txBody>
+        </p:sp>
+        <p:sp>
+          <p:nvSpPr>
+            <p:cNvPr id="6" name="Rounded Rectangle 5"/>
+            <p:cNvSpPr/>
+            <p:nvPr/>
+          </p:nvSpPr>
+          <p:spPr>
+            <a:xfrm>
+              <a:off x="1423912" y="2727939"/>
+              <a:ext cx="495536" cy="446761"/>
+            </a:xfrm>
+            <a:prstGeom prst="roundRect">
+              <a:avLst/>
+            </a:prstGeom>
+            <a:noFill/>
+            <a:ln>
+              <a:solidFill>
+                <a:schemeClr val="tx1"/>
+              </a:solidFill>
+            </a:ln>
+            <a:effectLst/>
+          </p:spPr>
+          <p:style>
+            <a:lnRef idx="1">
+              <a:schemeClr val="accent1"/>
+            </a:lnRef>
+            <a:fillRef idx="3">
+              <a:schemeClr val="accent1"/>
+            </a:fillRef>
+            <a:effectRef idx="2">
+              <a:schemeClr val="accent1"/>
+            </a:effectRef>
+            <a:fontRef idx="minor">
+              <a:schemeClr val="lt1"/>
+            </a:fontRef>
+          </p:style>
+          <p:txBody>
+            <a:bodyPr rtlCol="0" anchor="ctr"/>
+            <a:lstStyle/>
+            <a:p>
+              <a:pPr algn="ctr"/>
+              <a:r>
+                <a:rPr lang="en-US" sz="1400" dirty="0" smtClean="0">
+                  <a:solidFill>
+                    <a:srgbClr val="000000"/>
+                  </a:solidFill>
+                </a:rPr>
+                <a:t>FR</a:t>
+              </a:r>
+              <a:endParaRPr lang="en-US" sz="1400" dirty="0">
+                <a:solidFill>
+                  <a:srgbClr val="000000"/>
+                </a:solidFill>
+              </a:endParaRPr>
+            </a:p>
+          </p:txBody>
+        </p:sp>
+        <p:sp>
+          <p:nvSpPr>
+            <p:cNvPr id="7" name="Rounded Rectangle 6"/>
+            <p:cNvSpPr/>
+            <p:nvPr/>
+          </p:nvSpPr>
+          <p:spPr>
+            <a:xfrm>
+              <a:off x="2099317" y="2727939"/>
+              <a:ext cx="495536" cy="446761"/>
+            </a:xfrm>
+            <a:prstGeom prst="roundRect">
+              <a:avLst/>
+            </a:prstGeom>
+            <a:noFill/>
+            <a:ln>
+              <a:solidFill>
+                <a:schemeClr val="tx1"/>
+              </a:solidFill>
+            </a:ln>
+            <a:effectLst/>
+          </p:spPr>
+          <p:style>
+            <a:lnRef idx="1">
+              <a:schemeClr val="accent1"/>
+            </a:lnRef>
+            <a:fillRef idx="3">
+              <a:schemeClr val="accent1"/>
+            </a:fillRef>
+            <a:effectRef idx="2">
+              <a:schemeClr val="accent1"/>
+            </a:effectRef>
+            <a:fontRef idx="minor">
+              <a:schemeClr val="lt1"/>
+            </a:fontRef>
+          </p:style>
+          <p:txBody>
+            <a:bodyPr rtlCol="0" anchor="ctr"/>
+            <a:lstStyle/>
+            <a:p>
+              <a:pPr algn="ctr"/>
+              <a:r>
+                <a:rPr lang="en-US" sz="1400" dirty="0" smtClean="0">
+                  <a:solidFill>
+                    <a:srgbClr val="000000"/>
+                  </a:solidFill>
+                </a:rPr>
+                <a:t>FR</a:t>
+              </a:r>
+              <a:endParaRPr lang="en-US" sz="1400" dirty="0">
+                <a:solidFill>
+                  <a:srgbClr val="000000"/>
+                </a:solidFill>
+              </a:endParaRPr>
+            </a:p>
+          </p:txBody>
+        </p:sp>
+        <p:sp>
+          <p:nvSpPr>
+            <p:cNvPr id="8" name="Rounded Rectangle 7"/>
+            <p:cNvSpPr/>
+            <p:nvPr/>
+          </p:nvSpPr>
+          <p:spPr>
+            <a:xfrm>
+              <a:off x="3032336" y="2727939"/>
+              <a:ext cx="495536" cy="446761"/>
+            </a:xfrm>
+            <a:prstGeom prst="roundRect">
+              <a:avLst/>
+            </a:prstGeom>
+            <a:noFill/>
+            <a:ln>
+              <a:solidFill>
+                <a:schemeClr val="tx1"/>
+              </a:solidFill>
+            </a:ln>
+            <a:effectLst/>
+          </p:spPr>
+          <p:style>
+            <a:lnRef idx="1">
+              <a:schemeClr val="accent1"/>
+            </a:lnRef>
+            <a:fillRef idx="3">
+              <a:schemeClr val="accent1"/>
+            </a:fillRef>
+            <a:effectRef idx="2">
+              <a:schemeClr val="accent1"/>
+            </a:effectRef>
+            <a:fontRef idx="minor">
+              <a:schemeClr val="lt1"/>
+            </a:fontRef>
+          </p:style>
+          <p:txBody>
+            <a:bodyPr rtlCol="0" anchor="ctr"/>
+            <a:lstStyle/>
+            <a:p>
+              <a:pPr algn="ctr"/>
+              <a:r>
+                <a:rPr lang="en-US" sz="1400" dirty="0" smtClean="0">
+                  <a:solidFill>
+                    <a:srgbClr val="000000"/>
+                  </a:solidFill>
+                </a:rPr>
+                <a:t>FR</a:t>
+              </a:r>
+              <a:endParaRPr lang="en-US" sz="1400" dirty="0">
+                <a:solidFill>
+                  <a:srgbClr val="000000"/>
+                </a:solidFill>
+              </a:endParaRPr>
+            </a:p>
+          </p:txBody>
+        </p:sp>
+        <p:sp>
+          <p:nvSpPr>
+            <p:cNvPr id="9" name="Rounded Rectangle 8"/>
+            <p:cNvSpPr/>
+            <p:nvPr/>
+          </p:nvSpPr>
+          <p:spPr>
+            <a:xfrm>
+              <a:off x="3766328" y="2724843"/>
+              <a:ext cx="495536" cy="446761"/>
+            </a:xfrm>
+            <a:prstGeom prst="roundRect">
+              <a:avLst/>
+            </a:prstGeom>
+            <a:noFill/>
+            <a:ln>
+              <a:solidFill>
+                <a:schemeClr val="tx1"/>
+              </a:solidFill>
+            </a:ln>
+            <a:effectLst/>
+          </p:spPr>
+          <p:style>
+            <a:lnRef idx="1">
+              <a:schemeClr val="accent1"/>
+            </a:lnRef>
+            <a:fillRef idx="3">
+              <a:schemeClr val="accent1"/>
+            </a:fillRef>
+            <a:effectRef idx="2">
+              <a:schemeClr val="accent1"/>
+            </a:effectRef>
+            <a:fontRef idx="minor">
+              <a:schemeClr val="lt1"/>
+            </a:fontRef>
+          </p:style>
+          <p:txBody>
+            <a:bodyPr rtlCol="0" anchor="ctr"/>
+            <a:lstStyle/>
+            <a:p>
+              <a:pPr algn="ctr"/>
+              <a:r>
+                <a:rPr lang="en-US" sz="1400" dirty="0" smtClean="0">
+                  <a:solidFill>
+                    <a:srgbClr val="000000"/>
+                  </a:solidFill>
+                </a:rPr>
+                <a:t>FR</a:t>
+              </a:r>
+              <a:endParaRPr lang="en-US" sz="1400" dirty="0">
+                <a:solidFill>
+                  <a:srgbClr val="000000"/>
+                </a:solidFill>
+              </a:endParaRPr>
+            </a:p>
+          </p:txBody>
+        </p:sp>
+        <p:sp>
+          <p:nvSpPr>
+            <p:cNvPr id="10" name="TextBox 9"/>
+            <p:cNvSpPr txBox="1"/>
+            <p:nvPr/>
+          </p:nvSpPr>
+          <p:spPr>
+            <a:xfrm>
+              <a:off x="2646689" y="2724843"/>
+              <a:ext cx="301209" cy="369332"/>
+            </a:xfrm>
+            <a:prstGeom prst="rect">
+              <a:avLst/>
+            </a:prstGeom>
+            <a:noFill/>
+          </p:spPr>
+          <p:txBody>
+            <a:bodyPr wrap="none" rtlCol="0">
+              <a:spAutoFit/>
+            </a:bodyPr>
+            <a:lstStyle/>
+            <a:p>
+              <a:r>
+                <a:rPr lang="en-US" dirty="0" smtClean="0"/>
+                <a:t>..</a:t>
+              </a:r>
+              <a:endParaRPr lang="en-US" dirty="0"/>
+            </a:p>
+          </p:txBody>
+        </p:sp>
+        <p:cxnSp>
+          <p:nvCxnSpPr>
+            <p:cNvPr id="14" name="Straight Connector 13"/>
+            <p:cNvCxnSpPr>
+              <a:stCxn id="4" idx="2"/>
+              <a:endCxn id="5" idx="0"/>
+            </p:cNvCxnSpPr>
+            <p:nvPr/>
+          </p:nvCxnSpPr>
+          <p:spPr>
+            <a:xfrm>
+              <a:off x="2813595" y="1049594"/>
+              <a:ext cx="0" cy="751562"/>
+            </a:xfrm>
+            <a:prstGeom prst="line">
+              <a:avLst/>
+            </a:prstGeom>
+            <a:ln>
+              <a:solidFill>
+                <a:schemeClr val="tx1"/>
+              </a:solidFill>
+            </a:ln>
+            <a:effectLst/>
+          </p:spPr>
+          <p:style>
+            <a:lnRef idx="2">
+              <a:schemeClr val="accent1"/>
+            </a:lnRef>
+            <a:fillRef idx="0">
+              <a:schemeClr val="accent1"/>
+            </a:fillRef>
+            <a:effectRef idx="1">
+              <a:schemeClr val="accent1"/>
+            </a:effectRef>
+            <a:fontRef idx="minor">
+              <a:schemeClr val="tx1"/>
+            </a:fontRef>
+          </p:style>
+        </p:cxnSp>
+        <p:cxnSp>
+          <p:nvCxnSpPr>
+            <p:cNvPr id="15" name="Straight Connector 14"/>
+            <p:cNvCxnSpPr>
+              <a:stCxn id="5" idx="2"/>
+              <a:endCxn id="7" idx="0"/>
+            </p:cNvCxnSpPr>
+            <p:nvPr/>
+          </p:nvCxnSpPr>
+          <p:spPr>
+            <a:xfrm flipH="1">
+              <a:off x="2347085" y="2199758"/>
+              <a:ext cx="466510" cy="528181"/>
+            </a:xfrm>
+            <a:prstGeom prst="line">
+              <a:avLst/>
+            </a:prstGeom>
+            <a:ln>
+              <a:solidFill>
+                <a:schemeClr val="tx1"/>
+              </a:solidFill>
+            </a:ln>
+            <a:effectLst/>
+          </p:spPr>
+          <p:style>
+            <a:lnRef idx="2">
+              <a:schemeClr val="accent1"/>
+            </a:lnRef>
+            <a:fillRef idx="0">
+              <a:schemeClr val="accent1"/>
+            </a:fillRef>
+            <a:effectRef idx="1">
+              <a:schemeClr val="accent1"/>
+            </a:effectRef>
+            <a:fontRef idx="minor">
+              <a:schemeClr val="tx1"/>
+            </a:fontRef>
+          </p:style>
+        </p:cxnSp>
+        <p:cxnSp>
+          <p:nvCxnSpPr>
+            <p:cNvPr id="18" name="Straight Connector 17"/>
+            <p:cNvCxnSpPr>
+              <a:stCxn id="5" idx="2"/>
+              <a:endCxn id="6" idx="0"/>
+            </p:cNvCxnSpPr>
+            <p:nvPr/>
+          </p:nvCxnSpPr>
+          <p:spPr>
+            <a:xfrm flipH="1">
+              <a:off x="1671680" y="2199758"/>
+              <a:ext cx="1141915" cy="528181"/>
+            </a:xfrm>
+            <a:prstGeom prst="line">
+              <a:avLst/>
+            </a:prstGeom>
+            <a:ln>
+              <a:solidFill>
+                <a:schemeClr val="tx1"/>
+              </a:solidFill>
+            </a:ln>
+            <a:effectLst/>
+          </p:spPr>
+          <p:style>
+            <a:lnRef idx="2">
+              <a:schemeClr val="accent1"/>
+            </a:lnRef>
+            <a:fillRef idx="0">
+              <a:schemeClr val="accent1"/>
+            </a:fillRef>
+            <a:effectRef idx="1">
+              <a:schemeClr val="accent1"/>
+            </a:effectRef>
+            <a:fontRef idx="minor">
+              <a:schemeClr val="tx1"/>
+            </a:fontRef>
+          </p:style>
+        </p:cxnSp>
+        <p:cxnSp>
+          <p:nvCxnSpPr>
+            <p:cNvPr id="21" name="Straight Connector 20"/>
+            <p:cNvCxnSpPr>
+              <a:stCxn id="5" idx="2"/>
+              <a:endCxn id="8" idx="0"/>
+            </p:cNvCxnSpPr>
+            <p:nvPr/>
+          </p:nvCxnSpPr>
+          <p:spPr>
+            <a:xfrm>
+              <a:off x="2813595" y="2199758"/>
+              <a:ext cx="466509" cy="528181"/>
+            </a:xfrm>
+            <a:prstGeom prst="line">
+              <a:avLst/>
+            </a:prstGeom>
+            <a:ln>
+              <a:solidFill>
+                <a:schemeClr val="tx1"/>
+              </a:solidFill>
+            </a:ln>
+            <a:effectLst/>
+          </p:spPr>
+          <p:style>
+            <a:lnRef idx="2">
+              <a:schemeClr val="accent1"/>
+            </a:lnRef>
+            <a:fillRef idx="0">
+              <a:schemeClr val="accent1"/>
+            </a:fillRef>
+            <a:effectRef idx="1">
+              <a:schemeClr val="accent1"/>
+            </a:effectRef>
+            <a:fontRef idx="minor">
+              <a:schemeClr val="tx1"/>
+            </a:fontRef>
+          </p:style>
+        </p:cxnSp>
+        <p:cxnSp>
+          <p:nvCxnSpPr>
+            <p:cNvPr id="24" name="Straight Connector 23"/>
+            <p:cNvCxnSpPr>
+              <a:stCxn id="5" idx="2"/>
+              <a:endCxn id="9" idx="0"/>
+            </p:cNvCxnSpPr>
+            <p:nvPr/>
+          </p:nvCxnSpPr>
+          <p:spPr>
+            <a:xfrm>
+              <a:off x="2813595" y="2199758"/>
+              <a:ext cx="1200501" cy="525085"/>
+            </a:xfrm>
+            <a:prstGeom prst="line">
+              <a:avLst/>
+            </a:prstGeom>
+            <a:ln>
+              <a:solidFill>
+                <a:schemeClr val="tx1"/>
+              </a:solidFill>
+            </a:ln>
+            <a:effectLst/>
+          </p:spPr>
+          <p:style>
+            <a:lnRef idx="2">
+              <a:schemeClr val="accent1"/>
+            </a:lnRef>
+            <a:fillRef idx="0">
+              <a:schemeClr val="accent1"/>
+            </a:fillRef>
+            <a:effectRef idx="1">
+              <a:schemeClr val="accent1"/>
+            </a:effectRef>
+            <a:fontRef idx="minor">
+              <a:schemeClr val="tx1"/>
+            </a:fontRef>
+          </p:style>
+        </p:cxnSp>
+        <p:cxnSp>
+          <p:nvCxnSpPr>
+            <p:cNvPr id="42" name="Elbow Connector 41"/>
+            <p:cNvCxnSpPr>
+              <a:endCxn id="4" idx="1"/>
+            </p:cNvCxnSpPr>
+            <p:nvPr/>
+          </p:nvCxnSpPr>
+          <p:spPr>
+            <a:xfrm rot="5400000" flipH="1" flipV="1">
+              <a:off x="454524" y="1255982"/>
+              <a:ext cx="2111891" cy="1284462"/>
+            </a:xfrm>
+            <a:prstGeom prst="bentConnector2">
+              <a:avLst/>
+            </a:prstGeom>
+            <a:ln>
               <a:solidFill>
                 <a:srgbClr val="000000"/>
               </a:solidFill>
-            </a:endParaRPr>
-          </a:p>
-        </p:txBody>
-      </p:sp>
-      <p:sp>
-        <p:nvSpPr>
-          <p:cNvPr id="5" name="Rounded Rectangle 4"/>
-          <p:cNvSpPr/>
-          <p:nvPr/>
-        </p:nvSpPr>
-        <p:spPr>
-          <a:xfrm>
-            <a:off x="2152700" y="1801156"/>
-            <a:ext cx="1321789" cy="398602"/>
-          </a:xfrm>
-          <a:prstGeom prst="roundRect">
-            <a:avLst/>
-          </a:prstGeom>
-          <a:noFill/>
-          <a:ln>
-            <a:solidFill>
+            </a:ln>
+            <a:effectLst/>
+          </p:spPr>
+          <p:style>
+            <a:lnRef idx="2">
+              <a:schemeClr val="accent1"/>
+            </a:lnRef>
+            <a:fillRef idx="0">
+              <a:schemeClr val="accent1"/>
+            </a:fillRef>
+            <a:effectRef idx="1">
+              <a:schemeClr val="accent1"/>
+            </a:effectRef>
+            <a:fontRef idx="minor">
               <a:schemeClr val="tx1"/>
-            </a:solidFill>
-            <a:prstDash val="dash"/>
-          </a:ln>
-          <a:effectLst/>
-        </p:spPr>
-        <p:style>
-          <a:lnRef idx="1">
-            <a:schemeClr val="accent1"/>
-          </a:lnRef>
-          <a:fillRef idx="3">
-            <a:schemeClr val="accent1"/>
-          </a:fillRef>
-          <a:effectRef idx="2">
-            <a:schemeClr val="accent1"/>
-          </a:effectRef>
-          <a:fontRef idx="minor">
-            <a:schemeClr val="lt1"/>
-          </a:fontRef>
-        </p:style>
-        <p:txBody>
-          <a:bodyPr rtlCol="0" anchor="ctr"/>
-          <a:lstStyle/>
-          <a:p>
-            <a:pPr algn="ctr"/>
-            <a:r>
-              <a:rPr lang="en-US" sz="1400" dirty="0" smtClean="0">
+            </a:fontRef>
+          </p:style>
+        </p:cxnSp>
+        <p:cxnSp>
+          <p:nvCxnSpPr>
+            <p:cNvPr id="45" name="Straight Connector 44"/>
+            <p:cNvCxnSpPr/>
+            <p:nvPr/>
+          </p:nvCxnSpPr>
+          <p:spPr>
+            <a:xfrm flipH="1">
+              <a:off x="907109" y="2954158"/>
+              <a:ext cx="388758" cy="0"/>
+            </a:xfrm>
+            <a:prstGeom prst="line">
+              <a:avLst/>
+            </a:prstGeom>
+            <a:ln>
+              <a:solidFill>
+                <a:srgbClr val="000000"/>
+              </a:solidFill>
+              <a:prstDash val="sysDash"/>
+            </a:ln>
+            <a:effectLst/>
+          </p:spPr>
+          <p:style>
+            <a:lnRef idx="2">
+              <a:schemeClr val="accent1"/>
+            </a:lnRef>
+            <a:fillRef idx="0">
+              <a:schemeClr val="accent1"/>
+            </a:fillRef>
+            <a:effectRef idx="1">
+              <a:schemeClr val="accent1"/>
+            </a:effectRef>
+            <a:fontRef idx="minor">
+              <a:schemeClr val="tx1"/>
+            </a:fontRef>
+          </p:style>
+        </p:cxnSp>
+        <p:sp>
+          <p:nvSpPr>
+            <p:cNvPr id="48" name="TextBox 47"/>
+            <p:cNvSpPr txBox="1"/>
+            <p:nvPr/>
+          </p:nvSpPr>
+          <p:spPr>
+            <a:xfrm>
+              <a:off x="3806752" y="518318"/>
+              <a:ext cx="2890535" cy="600164"/>
+            </a:xfrm>
+            <a:prstGeom prst="rect">
+              <a:avLst/>
+            </a:prstGeom>
+            <a:noFill/>
+          </p:spPr>
+          <p:txBody>
+            <a:bodyPr wrap="none" rtlCol="0">
+              <a:spAutoFit/>
+            </a:bodyPr>
+            <a:lstStyle/>
+            <a:p>
+              <a:pPr marL="171450" indent="-171450">
+                <a:buFontTx/>
+                <a:buChar char="-"/>
+              </a:pPr>
+              <a:r>
+                <a:rPr lang="en-US" sz="1100" dirty="0" smtClean="0"/>
+                <a:t>Views map (radiation + FR positions)</a:t>
+              </a:r>
+            </a:p>
+            <a:p>
+              <a:pPr marL="171450" indent="-171450">
+                <a:buFontTx/>
+                <a:buChar char="-"/>
+              </a:pPr>
+              <a:r>
+                <a:rPr lang="en-US" sz="1100" dirty="0" smtClean="0"/>
+                <a:t>Views agent instructions</a:t>
+              </a:r>
+            </a:p>
+            <a:p>
+              <a:pPr marL="171450" indent="-171450">
+                <a:buFontTx/>
+                <a:buChar char="-"/>
+              </a:pPr>
+              <a:r>
+                <a:rPr lang="en-US" sz="1100" dirty="0" smtClean="0"/>
+                <a:t>Commands to FRs though instant messaging</a:t>
+              </a:r>
+            </a:p>
+          </p:txBody>
+        </p:sp>
+        <p:sp>
+          <p:nvSpPr>
+            <p:cNvPr id="49" name="TextBox 48"/>
+            <p:cNvSpPr txBox="1"/>
+            <p:nvPr/>
+          </p:nvSpPr>
+          <p:spPr>
+            <a:xfrm>
+              <a:off x="3806752" y="1715690"/>
+              <a:ext cx="2775119" cy="600164"/>
+            </a:xfrm>
+            <a:prstGeom prst="rect">
+              <a:avLst/>
+            </a:prstGeom>
+            <a:noFill/>
+          </p:spPr>
+          <p:txBody>
+            <a:bodyPr wrap="none" rtlCol="0">
+              <a:spAutoFit/>
+            </a:bodyPr>
+            <a:lstStyle/>
+            <a:p>
+              <a:pPr marL="171450" indent="-171450">
+                <a:buFontTx/>
+                <a:buChar char="-"/>
+              </a:pPr>
+              <a:r>
+                <a:rPr lang="en-US" sz="1100" dirty="0" smtClean="0"/>
+                <a:t>Views map (radiation + FR positions)</a:t>
+              </a:r>
+            </a:p>
+            <a:p>
+              <a:pPr marL="171450" indent="-171450">
+                <a:buFontTx/>
+                <a:buChar char="-"/>
+              </a:pPr>
+              <a:r>
+                <a:rPr lang="en-US" sz="1100" dirty="0" smtClean="0"/>
+                <a:t>Commands to FRs through action requests</a:t>
+              </a:r>
+            </a:p>
+            <a:p>
+              <a:pPr marL="171450" indent="-171450">
+                <a:buFontTx/>
+                <a:buChar char="-"/>
+              </a:pPr>
+              <a:endParaRPr lang="en-US" sz="1100" dirty="0" smtClean="0"/>
+            </a:p>
+          </p:txBody>
+        </p:sp>
+        <p:sp>
+          <p:nvSpPr>
+            <p:cNvPr id="58" name="TextBox 57"/>
+            <p:cNvSpPr txBox="1"/>
+            <p:nvPr/>
+          </p:nvSpPr>
+          <p:spPr>
+            <a:xfrm>
+              <a:off x="4667086" y="2536630"/>
+              <a:ext cx="2249334" cy="938719"/>
+            </a:xfrm>
+            <a:prstGeom prst="rect">
+              <a:avLst/>
+            </a:prstGeom>
+            <a:noFill/>
+          </p:spPr>
+          <p:txBody>
+            <a:bodyPr wrap="none" rtlCol="0">
+              <a:spAutoFit/>
+            </a:bodyPr>
+            <a:lstStyle/>
+            <a:p>
+              <a:pPr marL="171450" indent="-171450">
+                <a:buFontTx/>
+                <a:buChar char="-"/>
+              </a:pPr>
+              <a:r>
+                <a:rPr lang="en-US" sz="1100" dirty="0" smtClean="0"/>
+                <a:t>Gets point radiation level</a:t>
+              </a:r>
+              <a:endParaRPr lang="en-US" sz="1100" dirty="0" smtClean="0"/>
+            </a:p>
+            <a:p>
+              <a:pPr marL="171450" indent="-171450">
+                <a:buFontTx/>
+                <a:buChar char="-"/>
+              </a:pPr>
+              <a:r>
+                <a:rPr lang="en-US" sz="1100" dirty="0" smtClean="0"/>
+                <a:t>Commands to FRs</a:t>
+              </a:r>
+            </a:p>
+            <a:p>
+              <a:pPr marL="171450" indent="-171450">
+                <a:buFontTx/>
+                <a:buChar char="-"/>
+              </a:pPr>
+              <a:r>
+                <a:rPr lang="en-US" sz="1100" dirty="0" smtClean="0"/>
+                <a:t>Message to Human Coordinator</a:t>
+              </a:r>
+            </a:p>
+            <a:p>
+              <a:pPr marL="171450" indent="-171450">
+                <a:buFontTx/>
+                <a:buChar char="-"/>
+              </a:pPr>
+              <a:r>
+                <a:rPr lang="en-US" sz="1100" dirty="0" smtClean="0"/>
+                <a:t>Accept/Reject to Planner Agent</a:t>
+              </a:r>
+            </a:p>
+            <a:p>
+              <a:pPr marL="171450" indent="-171450">
+                <a:buFontTx/>
+                <a:buChar char="-"/>
+              </a:pPr>
+              <a:endParaRPr lang="en-US" sz="1100" dirty="0" smtClean="0"/>
+            </a:p>
+          </p:txBody>
+        </p:sp>
+        <p:sp>
+          <p:nvSpPr>
+            <p:cNvPr id="59" name="Rounded Rectangle 58"/>
+            <p:cNvSpPr/>
+            <p:nvPr/>
+          </p:nvSpPr>
+          <p:spPr>
+            <a:xfrm>
+              <a:off x="2011712" y="531276"/>
+              <a:ext cx="1637985" cy="1773148"/>
+            </a:xfrm>
+            <a:prstGeom prst="roundRect">
+              <a:avLst>
+                <a:gd name="adj" fmla="val 0"/>
+              </a:avLst>
+            </a:prstGeom>
+            <a:noFill/>
+            <a:ln>
+              <a:solidFill>
+                <a:schemeClr val="tx1"/>
+              </a:solidFill>
+              <a:prstDash val="dot"/>
+            </a:ln>
+            <a:effectLst/>
+          </p:spPr>
+          <p:style>
+            <a:lnRef idx="1">
+              <a:schemeClr val="accent1"/>
+            </a:lnRef>
+            <a:fillRef idx="3">
+              <a:schemeClr val="accent1"/>
+            </a:fillRef>
+            <a:effectRef idx="2">
+              <a:schemeClr val="accent1"/>
+            </a:effectRef>
+            <a:fontRef idx="minor">
+              <a:schemeClr val="lt1"/>
+            </a:fontRef>
+          </p:style>
+          <p:txBody>
+            <a:bodyPr rtlCol="0" anchor="ctr"/>
+            <a:lstStyle/>
+            <a:p>
+              <a:pPr algn="ctr"/>
+              <a:endParaRPr lang="en-US" sz="1200" dirty="0">
                 <a:solidFill>
                   <a:srgbClr val="000000"/>
                 </a:solidFill>
-              </a:rPr>
-              <a:t>Planner Agent</a:t>
-            </a:r>
-            <a:endParaRPr lang="en-US" sz="1400" dirty="0">
+              </a:endParaRPr>
+            </a:p>
+          </p:txBody>
+        </p:sp>
+        <p:sp>
+          <p:nvSpPr>
+            <p:cNvPr id="60" name="TextBox 59"/>
+            <p:cNvSpPr txBox="1"/>
+            <p:nvPr/>
+          </p:nvSpPr>
+          <p:spPr>
+            <a:xfrm>
+              <a:off x="2011712" y="1235927"/>
+              <a:ext cx="483801" cy="369332"/>
+            </a:xfrm>
+            <a:prstGeom prst="rect">
+              <a:avLst/>
+            </a:prstGeom>
+            <a:noFill/>
+          </p:spPr>
+          <p:txBody>
+            <a:bodyPr wrap="none" rtlCol="0">
+              <a:spAutoFit/>
+            </a:bodyPr>
+            <a:lstStyle/>
+            <a:p>
+              <a:r>
+                <a:rPr lang="en-US" dirty="0" smtClean="0"/>
+                <a:t>HQ</a:t>
+              </a:r>
+              <a:endParaRPr lang="en-US" dirty="0"/>
+            </a:p>
+          </p:txBody>
+        </p:sp>
+        <p:sp>
+          <p:nvSpPr>
+            <p:cNvPr id="61" name="Left Brace 60"/>
+            <p:cNvSpPr/>
+            <p:nvPr/>
+          </p:nvSpPr>
+          <p:spPr>
+            <a:xfrm>
+              <a:off x="3474489" y="479444"/>
+              <a:ext cx="529757" cy="716786"/>
+            </a:xfrm>
+            <a:prstGeom prst="leftBrace">
+              <a:avLst/>
+            </a:prstGeom>
+            <a:ln w="9525" cmpd="sng">
               <a:solidFill>
                 <a:srgbClr val="000000"/>
               </a:solidFill>
-            </a:endParaRPr>
-          </a:p>
-        </p:txBody>
-      </p:sp>
-      <p:sp>
-        <p:nvSpPr>
-          <p:cNvPr id="6" name="Rounded Rectangle 5"/>
-          <p:cNvSpPr/>
-          <p:nvPr/>
-        </p:nvSpPr>
-        <p:spPr>
-          <a:xfrm>
-            <a:off x="1423912" y="2727939"/>
-            <a:ext cx="495536" cy="446761"/>
-          </a:xfrm>
-          <a:prstGeom prst="roundRect">
-            <a:avLst/>
-          </a:prstGeom>
-          <a:noFill/>
-          <a:ln>
-            <a:solidFill>
+            </a:ln>
+            <a:effectLst/>
+          </p:spPr>
+          <p:style>
+            <a:lnRef idx="2">
+              <a:schemeClr val="accent1"/>
+            </a:lnRef>
+            <a:fillRef idx="0">
+              <a:schemeClr val="accent1"/>
+            </a:fillRef>
+            <a:effectRef idx="1">
+              <a:schemeClr val="accent1"/>
+            </a:effectRef>
+            <a:fontRef idx="minor">
               <a:schemeClr val="tx1"/>
-            </a:solidFill>
-          </a:ln>
-          <a:effectLst/>
-        </p:spPr>
-        <p:style>
-          <a:lnRef idx="1">
-            <a:schemeClr val="accent1"/>
-          </a:lnRef>
-          <a:fillRef idx="3">
-            <a:schemeClr val="accent1"/>
-          </a:fillRef>
-          <a:effectRef idx="2">
-            <a:schemeClr val="accent1"/>
-          </a:effectRef>
-          <a:fontRef idx="minor">
-            <a:schemeClr val="lt1"/>
-          </a:fontRef>
-        </p:style>
-        <p:txBody>
-          <a:bodyPr rtlCol="0" anchor="ctr"/>
-          <a:lstStyle/>
-          <a:p>
-            <a:pPr algn="ctr"/>
-            <a:r>
-              <a:rPr lang="en-US" sz="1400" dirty="0" smtClean="0">
-                <a:solidFill>
-                  <a:srgbClr val="000000"/>
-                </a:solidFill>
-              </a:rPr>
-              <a:t>FR</a:t>
-            </a:r>
-            <a:endParaRPr lang="en-US" sz="1400" dirty="0">
+            </a:fontRef>
+          </p:style>
+          <p:txBody>
+            <a:bodyPr rtlCol="0" anchor="ctr"/>
+            <a:lstStyle/>
+            <a:p>
+              <a:pPr algn="ctr"/>
+              <a:endParaRPr lang="en-US"/>
+            </a:p>
+          </p:txBody>
+        </p:sp>
+        <p:sp>
+          <p:nvSpPr>
+            <p:cNvPr id="62" name="Left Brace 61"/>
+            <p:cNvSpPr/>
+            <p:nvPr/>
+          </p:nvSpPr>
+          <p:spPr>
+            <a:xfrm>
+              <a:off x="3474489" y="1619219"/>
+              <a:ext cx="529757" cy="716786"/>
+            </a:xfrm>
+            <a:prstGeom prst="leftBrace">
+              <a:avLst/>
+            </a:prstGeom>
+            <a:ln w="9525" cmpd="sng">
               <a:solidFill>
                 <a:srgbClr val="000000"/>
               </a:solidFill>
-            </a:endParaRPr>
-          </a:p>
-        </p:txBody>
-      </p:sp>
-      <p:sp>
-        <p:nvSpPr>
-          <p:cNvPr id="7" name="Rounded Rectangle 6"/>
-          <p:cNvSpPr/>
-          <p:nvPr/>
-        </p:nvSpPr>
-        <p:spPr>
-          <a:xfrm>
-            <a:off x="2099317" y="2727939"/>
-            <a:ext cx="495536" cy="446761"/>
-          </a:xfrm>
-          <a:prstGeom prst="roundRect">
-            <a:avLst/>
-          </a:prstGeom>
-          <a:noFill/>
-          <a:ln>
-            <a:solidFill>
+            </a:ln>
+            <a:effectLst/>
+          </p:spPr>
+          <p:style>
+            <a:lnRef idx="2">
+              <a:schemeClr val="accent1"/>
+            </a:lnRef>
+            <a:fillRef idx="0">
+              <a:schemeClr val="accent1"/>
+            </a:fillRef>
+            <a:effectRef idx="1">
+              <a:schemeClr val="accent1"/>
+            </a:effectRef>
+            <a:fontRef idx="minor">
               <a:schemeClr val="tx1"/>
-            </a:solidFill>
-          </a:ln>
-          <a:effectLst/>
-        </p:spPr>
-        <p:style>
-          <a:lnRef idx="1">
-            <a:schemeClr val="accent1"/>
-          </a:lnRef>
-          <a:fillRef idx="3">
-            <a:schemeClr val="accent1"/>
-          </a:fillRef>
-          <a:effectRef idx="2">
-            <a:schemeClr val="accent1"/>
-          </a:effectRef>
-          <a:fontRef idx="minor">
-            <a:schemeClr val="lt1"/>
-          </a:fontRef>
-        </p:style>
-        <p:txBody>
-          <a:bodyPr rtlCol="0" anchor="ctr"/>
-          <a:lstStyle/>
-          <a:p>
-            <a:pPr algn="ctr"/>
-            <a:r>
-              <a:rPr lang="en-US" sz="1400" dirty="0" smtClean="0">
-                <a:solidFill>
-                  <a:srgbClr val="000000"/>
-                </a:solidFill>
-              </a:rPr>
-              <a:t>FR</a:t>
-            </a:r>
-            <a:endParaRPr lang="en-US" sz="1400" dirty="0">
+            </a:fontRef>
+          </p:style>
+          <p:txBody>
+            <a:bodyPr rtlCol="0" anchor="ctr"/>
+            <a:lstStyle/>
+            <a:p>
+              <a:pPr algn="ctr"/>
+              <a:endParaRPr lang="en-US"/>
+            </a:p>
+          </p:txBody>
+        </p:sp>
+        <p:sp>
+          <p:nvSpPr>
+            <p:cNvPr id="63" name="Left Brace 62"/>
+            <p:cNvSpPr/>
+            <p:nvPr/>
+          </p:nvSpPr>
+          <p:spPr>
+            <a:xfrm>
+              <a:off x="4261864" y="2595766"/>
+              <a:ext cx="529757" cy="716786"/>
+            </a:xfrm>
+            <a:prstGeom prst="leftBrace">
+              <a:avLst/>
+            </a:prstGeom>
+            <a:ln w="9525" cmpd="sng">
               <a:solidFill>
                 <a:srgbClr val="000000"/>
               </a:solidFill>
-            </a:endParaRPr>
-          </a:p>
-        </p:txBody>
-      </p:sp>
-      <p:sp>
-        <p:nvSpPr>
-          <p:cNvPr id="8" name="Rounded Rectangle 7"/>
-          <p:cNvSpPr/>
-          <p:nvPr/>
-        </p:nvSpPr>
-        <p:spPr>
-          <a:xfrm>
-            <a:off x="3032336" y="2727939"/>
-            <a:ext cx="495536" cy="446761"/>
-          </a:xfrm>
-          <a:prstGeom prst="roundRect">
-            <a:avLst/>
-          </a:prstGeom>
-          <a:noFill/>
-          <a:ln>
-            <a:solidFill>
+            </a:ln>
+            <a:effectLst/>
+          </p:spPr>
+          <p:style>
+            <a:lnRef idx="2">
+              <a:schemeClr val="accent1"/>
+            </a:lnRef>
+            <a:fillRef idx="0">
+              <a:schemeClr val="accent1"/>
+            </a:fillRef>
+            <a:effectRef idx="1">
+              <a:schemeClr val="accent1"/>
+            </a:effectRef>
+            <a:fontRef idx="minor">
               <a:schemeClr val="tx1"/>
-            </a:solidFill>
-          </a:ln>
-          <a:effectLst/>
-        </p:spPr>
-        <p:style>
-          <a:lnRef idx="1">
-            <a:schemeClr val="accent1"/>
-          </a:lnRef>
-          <a:fillRef idx="3">
-            <a:schemeClr val="accent1"/>
-          </a:fillRef>
-          <a:effectRef idx="2">
-            <a:schemeClr val="accent1"/>
-          </a:effectRef>
-          <a:fontRef idx="minor">
-            <a:schemeClr val="lt1"/>
-          </a:fontRef>
-        </p:style>
-        <p:txBody>
-          <a:bodyPr rtlCol="0" anchor="ctr"/>
-          <a:lstStyle/>
-          <a:p>
-            <a:pPr algn="ctr"/>
-            <a:r>
-              <a:rPr lang="en-US" sz="1400" dirty="0" smtClean="0">
-                <a:solidFill>
-                  <a:srgbClr val="000000"/>
-                </a:solidFill>
-              </a:rPr>
-              <a:t>FR</a:t>
-            </a:r>
-            <a:endParaRPr lang="en-US" sz="1400" dirty="0">
+            </a:fontRef>
+          </p:style>
+          <p:txBody>
+            <a:bodyPr rtlCol="0" anchor="ctr"/>
+            <a:lstStyle/>
+            <a:p>
+              <a:pPr algn="ctr"/>
+              <a:endParaRPr lang="en-US"/>
+            </a:p>
+          </p:txBody>
+        </p:sp>
+        <p:cxnSp>
+          <p:nvCxnSpPr>
+            <p:cNvPr id="65" name="Straight Connector 64"/>
+            <p:cNvCxnSpPr/>
+            <p:nvPr/>
+          </p:nvCxnSpPr>
+          <p:spPr>
+            <a:xfrm flipH="1">
+              <a:off x="1906489" y="2951320"/>
+              <a:ext cx="179869" cy="0"/>
+            </a:xfrm>
+            <a:prstGeom prst="line">
+              <a:avLst/>
+            </a:prstGeom>
+            <a:ln>
               <a:solidFill>
-                <a:srgbClr val="000000"/>
+                <a:schemeClr val="tx1"/>
               </a:solidFill>
-            </a:endParaRPr>
-          </a:p>
-        </p:txBody>
-      </p:sp>
-      <p:sp>
-        <p:nvSpPr>
-          <p:cNvPr id="9" name="Rounded Rectangle 8"/>
-          <p:cNvSpPr/>
-          <p:nvPr/>
-        </p:nvSpPr>
-        <p:spPr>
-          <a:xfrm>
-            <a:off x="3766328" y="2724843"/>
-            <a:ext cx="495536" cy="446761"/>
-          </a:xfrm>
-          <a:prstGeom prst="roundRect">
-            <a:avLst/>
-          </a:prstGeom>
-          <a:noFill/>
-          <a:ln>
-            <a:solidFill>
+            </a:ln>
+            <a:effectLst/>
+          </p:spPr>
+          <p:style>
+            <a:lnRef idx="2">
+              <a:schemeClr val="accent1"/>
+            </a:lnRef>
+            <a:fillRef idx="0">
+              <a:schemeClr val="accent1"/>
+            </a:fillRef>
+            <a:effectRef idx="1">
+              <a:schemeClr val="accent1"/>
+            </a:effectRef>
+            <a:fontRef idx="minor">
               <a:schemeClr val="tx1"/>
-            </a:solidFill>
-          </a:ln>
-          <a:effectLst/>
-        </p:spPr>
-        <p:style>
-          <a:lnRef idx="1">
-            <a:schemeClr val="accent1"/>
-          </a:lnRef>
-          <a:fillRef idx="3">
-            <a:schemeClr val="accent1"/>
-          </a:fillRef>
-          <a:effectRef idx="2">
-            <a:schemeClr val="accent1"/>
-          </a:effectRef>
-          <a:fontRef idx="minor">
-            <a:schemeClr val="lt1"/>
-          </a:fontRef>
-        </p:style>
-        <p:txBody>
-          <a:bodyPr rtlCol="0" anchor="ctr"/>
-          <a:lstStyle/>
-          <a:p>
-            <a:pPr algn="ctr"/>
-            <a:r>
-              <a:rPr lang="en-US" sz="1400" dirty="0" smtClean="0">
-                <a:solidFill>
-                  <a:srgbClr val="000000"/>
-                </a:solidFill>
-              </a:rPr>
-              <a:t>FR</a:t>
-            </a:r>
-            <a:endParaRPr lang="en-US" sz="1400" dirty="0">
+            </a:fontRef>
+          </p:style>
+        </p:cxnSp>
+        <p:cxnSp>
+          <p:nvCxnSpPr>
+            <p:cNvPr id="68" name="Straight Connector 67"/>
+            <p:cNvCxnSpPr/>
+            <p:nvPr/>
+          </p:nvCxnSpPr>
+          <p:spPr>
+            <a:xfrm flipH="1">
+              <a:off x="2581894" y="2951320"/>
+              <a:ext cx="140988" cy="0"/>
+            </a:xfrm>
+            <a:prstGeom prst="line">
+              <a:avLst/>
+            </a:prstGeom>
+            <a:ln>
               <a:solidFill>
-                <a:srgbClr val="000000"/>
+                <a:schemeClr val="tx1"/>
               </a:solidFill>
-            </a:endParaRPr>
-          </a:p>
-        </p:txBody>
-      </p:sp>
-      <p:sp>
-        <p:nvSpPr>
-          <p:cNvPr id="10" name="TextBox 9"/>
-          <p:cNvSpPr txBox="1"/>
-          <p:nvPr/>
-        </p:nvSpPr>
-        <p:spPr>
-          <a:xfrm>
-            <a:off x="2646689" y="2724843"/>
-            <a:ext cx="301209" cy="369332"/>
-          </a:xfrm>
-          <a:prstGeom prst="rect">
-            <a:avLst/>
-          </a:prstGeom>
-          <a:noFill/>
-        </p:spPr>
-        <p:txBody>
-          <a:bodyPr wrap="none" rtlCol="0">
-            <a:spAutoFit/>
-          </a:bodyPr>
-          <a:lstStyle/>
-          <a:p>
-            <a:r>
-              <a:rPr lang="en-US" dirty="0" smtClean="0"/>
-              <a:t>..</a:t>
-            </a:r>
-            <a:endParaRPr lang="en-US" dirty="0"/>
-          </a:p>
-        </p:txBody>
-      </p:sp>
-      <p:cxnSp>
-        <p:nvCxnSpPr>
-          <p:cNvPr id="14" name="Straight Connector 13"/>
-          <p:cNvCxnSpPr>
-            <a:stCxn id="4" idx="2"/>
-            <a:endCxn id="5" idx="0"/>
-          </p:cNvCxnSpPr>
-          <p:nvPr/>
-        </p:nvCxnSpPr>
-        <p:spPr>
-          <a:xfrm>
-            <a:off x="2813595" y="1049594"/>
-            <a:ext cx="0" cy="751562"/>
-          </a:xfrm>
-          <a:prstGeom prst="line">
-            <a:avLst/>
-          </a:prstGeom>
-          <a:ln>
-            <a:solidFill>
+            </a:ln>
+            <a:effectLst/>
+          </p:spPr>
+          <p:style>
+            <a:lnRef idx="2">
+              <a:schemeClr val="accent1"/>
+            </a:lnRef>
+            <a:fillRef idx="0">
+              <a:schemeClr val="accent1"/>
+            </a:fillRef>
+            <a:effectRef idx="1">
+              <a:schemeClr val="accent1"/>
+            </a:effectRef>
+            <a:fontRef idx="minor">
               <a:schemeClr val="tx1"/>
-            </a:solidFill>
-          </a:ln>
-          <a:effectLst/>
-        </p:spPr>
-        <p:style>
-          <a:lnRef idx="2">
-            <a:schemeClr val="accent1"/>
-          </a:lnRef>
-          <a:fillRef idx="0">
-            <a:schemeClr val="accent1"/>
-          </a:fillRef>
-          <a:effectRef idx="1">
-            <a:schemeClr val="accent1"/>
-          </a:effectRef>
-          <a:fontRef idx="minor">
-            <a:schemeClr val="tx1"/>
-          </a:fontRef>
-        </p:style>
-      </p:cxnSp>
-      <p:cxnSp>
-        <p:nvCxnSpPr>
-          <p:cNvPr id="15" name="Straight Connector 14"/>
-          <p:cNvCxnSpPr>
-            <a:stCxn id="5" idx="2"/>
-            <a:endCxn id="7" idx="0"/>
-          </p:cNvCxnSpPr>
-          <p:nvPr/>
-        </p:nvCxnSpPr>
-        <p:spPr>
-          <a:xfrm flipH="1">
-            <a:off x="2347085" y="2199758"/>
-            <a:ext cx="466510" cy="528181"/>
-          </a:xfrm>
-          <a:prstGeom prst="line">
-            <a:avLst/>
-          </a:prstGeom>
-          <a:ln>
-            <a:solidFill>
+            </a:fontRef>
+          </p:style>
+        </p:cxnSp>
+        <p:cxnSp>
+          <p:nvCxnSpPr>
+            <p:cNvPr id="71" name="Straight Connector 70"/>
+            <p:cNvCxnSpPr>
+              <a:stCxn id="9" idx="1"/>
+              <a:endCxn id="8" idx="3"/>
+            </p:cNvCxnSpPr>
+            <p:nvPr/>
+          </p:nvCxnSpPr>
+          <p:spPr>
+            <a:xfrm flipH="1">
+              <a:off x="3527872" y="2948224"/>
+              <a:ext cx="238456" cy="3096"/>
+            </a:xfrm>
+            <a:prstGeom prst="line">
+              <a:avLst/>
+            </a:prstGeom>
+            <a:ln>
+              <a:solidFill>
+                <a:schemeClr val="tx1"/>
+              </a:solidFill>
+            </a:ln>
+            <a:effectLst/>
+          </p:spPr>
+          <p:style>
+            <a:lnRef idx="2">
+              <a:schemeClr val="accent1"/>
+            </a:lnRef>
+            <a:fillRef idx="0">
+              <a:schemeClr val="accent1"/>
+            </a:fillRef>
+            <a:effectRef idx="1">
+              <a:schemeClr val="accent1"/>
+            </a:effectRef>
+            <a:fontRef idx="minor">
               <a:schemeClr val="tx1"/>
-            </a:solidFill>
-          </a:ln>
-          <a:effectLst/>
-        </p:spPr>
-        <p:style>
-          <a:lnRef idx="2">
-            <a:schemeClr val="accent1"/>
-          </a:lnRef>
-          <a:fillRef idx="0">
-            <a:schemeClr val="accent1"/>
-          </a:fillRef>
-          <a:effectRef idx="1">
-            <a:schemeClr val="accent1"/>
-          </a:effectRef>
-          <a:fontRef idx="minor">
-            <a:schemeClr val="tx1"/>
-          </a:fontRef>
-        </p:style>
-      </p:cxnSp>
-      <p:cxnSp>
-        <p:nvCxnSpPr>
-          <p:cNvPr id="18" name="Straight Connector 17"/>
-          <p:cNvCxnSpPr>
-            <a:stCxn id="5" idx="2"/>
-            <a:endCxn id="6" idx="0"/>
-          </p:cNvCxnSpPr>
-          <p:nvPr/>
-        </p:nvCxnSpPr>
-        <p:spPr>
-          <a:xfrm flipH="1">
-            <a:off x="1671680" y="2199758"/>
-            <a:ext cx="1141915" cy="528181"/>
-          </a:xfrm>
-          <a:prstGeom prst="line">
-            <a:avLst/>
-          </a:prstGeom>
-          <a:ln>
-            <a:solidFill>
+            </a:fontRef>
+          </p:style>
+        </p:cxnSp>
+        <p:cxnSp>
+          <p:nvCxnSpPr>
+            <p:cNvPr id="75" name="Straight Connector 74"/>
+            <p:cNvCxnSpPr>
+              <a:stCxn id="8" idx="1"/>
+            </p:cNvCxnSpPr>
+            <p:nvPr/>
+          </p:nvCxnSpPr>
+          <p:spPr>
+            <a:xfrm flipH="1" flipV="1">
+              <a:off x="2863884" y="2948224"/>
+              <a:ext cx="168452" cy="3096"/>
+            </a:xfrm>
+            <a:prstGeom prst="line">
+              <a:avLst/>
+            </a:prstGeom>
+            <a:ln>
+              <a:solidFill>
+                <a:schemeClr val="tx1"/>
+              </a:solidFill>
+            </a:ln>
+            <a:effectLst/>
+          </p:spPr>
+          <p:style>
+            <a:lnRef idx="2">
+              <a:schemeClr val="accent1"/>
+            </a:lnRef>
+            <a:fillRef idx="0">
+              <a:schemeClr val="accent1"/>
+            </a:fillRef>
+            <a:effectRef idx="1">
+              <a:schemeClr val="accent1"/>
+            </a:effectRef>
+            <a:fontRef idx="minor">
               <a:schemeClr val="tx1"/>
-            </a:solidFill>
-          </a:ln>
-          <a:effectLst/>
-        </p:spPr>
-        <p:style>
-          <a:lnRef idx="2">
-            <a:schemeClr val="accent1"/>
-          </a:lnRef>
-          <a:fillRef idx="0">
-            <a:schemeClr val="accent1"/>
-          </a:fillRef>
-          <a:effectRef idx="1">
-            <a:schemeClr val="accent1"/>
-          </a:effectRef>
-          <a:fontRef idx="minor">
-            <a:schemeClr val="tx1"/>
-          </a:fontRef>
-        </p:style>
-      </p:cxnSp>
-      <p:cxnSp>
-        <p:nvCxnSpPr>
-          <p:cNvPr id="21" name="Straight Connector 20"/>
-          <p:cNvCxnSpPr>
-            <a:stCxn id="5" idx="2"/>
-            <a:endCxn id="8" idx="0"/>
-          </p:cNvCxnSpPr>
-          <p:nvPr/>
-        </p:nvCxnSpPr>
-        <p:spPr>
-          <a:xfrm>
-            <a:off x="2813595" y="2199758"/>
-            <a:ext cx="466509" cy="528181"/>
-          </a:xfrm>
-          <a:prstGeom prst="line">
-            <a:avLst/>
-          </a:prstGeom>
-          <a:ln>
-            <a:solidFill>
-              <a:schemeClr val="tx1"/>
-            </a:solidFill>
-          </a:ln>
-          <a:effectLst/>
-        </p:spPr>
-        <p:style>
-          <a:lnRef idx="2">
-            <a:schemeClr val="accent1"/>
-          </a:lnRef>
-          <a:fillRef idx="0">
-            <a:schemeClr val="accent1"/>
-          </a:fillRef>
-          <a:effectRef idx="1">
-            <a:schemeClr val="accent1"/>
-          </a:effectRef>
-          <a:fontRef idx="minor">
-            <a:schemeClr val="tx1"/>
-          </a:fontRef>
-        </p:style>
-      </p:cxnSp>
-      <p:cxnSp>
-        <p:nvCxnSpPr>
-          <p:cNvPr id="24" name="Straight Connector 23"/>
-          <p:cNvCxnSpPr>
-            <a:stCxn id="5" idx="2"/>
-            <a:endCxn id="9" idx="0"/>
-          </p:cNvCxnSpPr>
-          <p:nvPr/>
-        </p:nvCxnSpPr>
-        <p:spPr>
-          <a:xfrm>
-            <a:off x="2813595" y="2199758"/>
-            <a:ext cx="1200501" cy="525085"/>
-          </a:xfrm>
-          <a:prstGeom prst="line">
-            <a:avLst/>
-          </a:prstGeom>
-          <a:ln>
-            <a:solidFill>
-              <a:schemeClr val="tx1"/>
-            </a:solidFill>
-          </a:ln>
-          <a:effectLst/>
-        </p:spPr>
-        <p:style>
-          <a:lnRef idx="2">
-            <a:schemeClr val="accent1"/>
-          </a:lnRef>
-          <a:fillRef idx="0">
-            <a:schemeClr val="accent1"/>
-          </a:fillRef>
-          <a:effectRef idx="1">
-            <a:schemeClr val="accent1"/>
-          </a:effectRef>
-          <a:fontRef idx="minor">
-            <a:schemeClr val="tx1"/>
-          </a:fontRef>
-        </p:style>
-      </p:cxnSp>
-      <p:cxnSp>
-        <p:nvCxnSpPr>
-          <p:cNvPr id="42" name="Elbow Connector 41"/>
-          <p:cNvCxnSpPr>
-            <a:endCxn id="4" idx="1"/>
-          </p:cNvCxnSpPr>
-          <p:nvPr/>
-        </p:nvCxnSpPr>
-        <p:spPr>
-          <a:xfrm rot="5400000" flipH="1" flipV="1">
-            <a:off x="454524" y="1255982"/>
-            <a:ext cx="2111891" cy="1284462"/>
-          </a:xfrm>
-          <a:prstGeom prst="bentConnector2">
-            <a:avLst/>
-          </a:prstGeom>
-          <a:ln>
-            <a:solidFill>
-              <a:srgbClr val="000000"/>
-            </a:solidFill>
-          </a:ln>
-          <a:effectLst/>
-        </p:spPr>
-        <p:style>
-          <a:lnRef idx="2">
-            <a:schemeClr val="accent1"/>
-          </a:lnRef>
-          <a:fillRef idx="0">
-            <a:schemeClr val="accent1"/>
-          </a:fillRef>
-          <a:effectRef idx="1">
-            <a:schemeClr val="accent1"/>
-          </a:effectRef>
-          <a:fontRef idx="minor">
-            <a:schemeClr val="tx1"/>
-          </a:fontRef>
-        </p:style>
-      </p:cxnSp>
-      <p:cxnSp>
-        <p:nvCxnSpPr>
-          <p:cNvPr id="45" name="Straight Connector 44"/>
-          <p:cNvCxnSpPr/>
-          <p:nvPr/>
-        </p:nvCxnSpPr>
-        <p:spPr>
-          <a:xfrm flipH="1">
-            <a:off x="907109" y="2954158"/>
-            <a:ext cx="388758" cy="0"/>
-          </a:xfrm>
-          <a:prstGeom prst="line">
-            <a:avLst/>
-          </a:prstGeom>
-          <a:ln>
-            <a:solidFill>
-              <a:srgbClr val="000000"/>
-            </a:solidFill>
-            <a:prstDash val="sysDash"/>
-          </a:ln>
-          <a:effectLst/>
-        </p:spPr>
-        <p:style>
-          <a:lnRef idx="2">
-            <a:schemeClr val="accent1"/>
-          </a:lnRef>
-          <a:fillRef idx="0">
-            <a:schemeClr val="accent1"/>
-          </a:fillRef>
-          <a:effectRef idx="1">
-            <a:schemeClr val="accent1"/>
-          </a:effectRef>
-          <a:fontRef idx="minor">
-            <a:schemeClr val="tx1"/>
-          </a:fontRef>
-        </p:style>
-      </p:cxnSp>
-      <p:sp>
-        <p:nvSpPr>
-          <p:cNvPr id="48" name="TextBox 47"/>
-          <p:cNvSpPr txBox="1"/>
-          <p:nvPr/>
-        </p:nvSpPr>
-        <p:spPr>
-          <a:xfrm>
-            <a:off x="3806752" y="518318"/>
-            <a:ext cx="2890535" cy="600164"/>
-          </a:xfrm>
-          <a:prstGeom prst="rect">
-            <a:avLst/>
-          </a:prstGeom>
-          <a:noFill/>
-        </p:spPr>
-        <p:txBody>
-          <a:bodyPr wrap="none" rtlCol="0">
-            <a:spAutoFit/>
-          </a:bodyPr>
-          <a:lstStyle/>
-          <a:p>
-            <a:pPr marL="171450" indent="-171450">
-              <a:buFontTx/>
-              <a:buChar char="-"/>
-            </a:pPr>
-            <a:r>
-              <a:rPr lang="en-US" sz="1100" dirty="0" smtClean="0"/>
-              <a:t>Views map (radiation + FR positions)</a:t>
-            </a:r>
-          </a:p>
-          <a:p>
-            <a:pPr marL="171450" indent="-171450">
-              <a:buFontTx/>
-              <a:buChar char="-"/>
-            </a:pPr>
-            <a:r>
-              <a:rPr lang="en-US" sz="1100" dirty="0" smtClean="0"/>
-              <a:t>Views agent instructions</a:t>
-            </a:r>
-          </a:p>
-          <a:p>
-            <a:pPr marL="171450" indent="-171450">
-              <a:buFontTx/>
-              <a:buChar char="-"/>
-            </a:pPr>
-            <a:r>
-              <a:rPr lang="en-US" sz="1100" dirty="0" smtClean="0"/>
-              <a:t>Commands to FRs though instant messaging</a:t>
-            </a:r>
-          </a:p>
-        </p:txBody>
-      </p:sp>
-      <p:sp>
-        <p:nvSpPr>
-          <p:cNvPr id="49" name="TextBox 48"/>
-          <p:cNvSpPr txBox="1"/>
-          <p:nvPr/>
-        </p:nvSpPr>
-        <p:spPr>
-          <a:xfrm>
-            <a:off x="3806752" y="1715690"/>
-            <a:ext cx="2775119" cy="600164"/>
-          </a:xfrm>
-          <a:prstGeom prst="rect">
-            <a:avLst/>
-          </a:prstGeom>
-          <a:noFill/>
-        </p:spPr>
-        <p:txBody>
-          <a:bodyPr wrap="none" rtlCol="0">
-            <a:spAutoFit/>
-          </a:bodyPr>
-          <a:lstStyle/>
-          <a:p>
-            <a:pPr marL="171450" indent="-171450">
-              <a:buFontTx/>
-              <a:buChar char="-"/>
-            </a:pPr>
-            <a:r>
-              <a:rPr lang="en-US" sz="1100" dirty="0" smtClean="0"/>
-              <a:t>Views map (radiation + FR positions)</a:t>
-            </a:r>
-          </a:p>
-          <a:p>
-            <a:pPr marL="171450" indent="-171450">
-              <a:buFontTx/>
-              <a:buChar char="-"/>
-            </a:pPr>
-            <a:r>
-              <a:rPr lang="en-US" sz="1100" dirty="0" smtClean="0"/>
-              <a:t>Commands to FRs through action requests</a:t>
-            </a:r>
-          </a:p>
-          <a:p>
-            <a:pPr marL="171450" indent="-171450">
-              <a:buFontTx/>
-              <a:buChar char="-"/>
-            </a:pPr>
-            <a:endParaRPr lang="en-US" sz="1100" dirty="0" smtClean="0"/>
-          </a:p>
-        </p:txBody>
-      </p:sp>
-      <p:sp>
-        <p:nvSpPr>
-          <p:cNvPr id="58" name="TextBox 57"/>
-          <p:cNvSpPr txBox="1"/>
-          <p:nvPr/>
-        </p:nvSpPr>
-        <p:spPr>
-          <a:xfrm>
-            <a:off x="4667086" y="2536630"/>
-            <a:ext cx="2249334" cy="938719"/>
-          </a:xfrm>
-          <a:prstGeom prst="rect">
-            <a:avLst/>
-          </a:prstGeom>
-          <a:noFill/>
-        </p:spPr>
-        <p:txBody>
-          <a:bodyPr wrap="none" rtlCol="0">
-            <a:spAutoFit/>
-          </a:bodyPr>
-          <a:lstStyle/>
-          <a:p>
-            <a:pPr marL="171450" indent="-171450">
-              <a:buFontTx/>
-              <a:buChar char="-"/>
-            </a:pPr>
-            <a:r>
-              <a:rPr lang="en-US" sz="1100" dirty="0" smtClean="0"/>
-              <a:t>Gets point radiation level</a:t>
-            </a:r>
-            <a:endParaRPr lang="en-US" sz="1100" dirty="0" smtClean="0"/>
-          </a:p>
-          <a:p>
-            <a:pPr marL="171450" indent="-171450">
-              <a:buFontTx/>
-              <a:buChar char="-"/>
-            </a:pPr>
-            <a:r>
-              <a:rPr lang="en-US" sz="1100" dirty="0" smtClean="0"/>
-              <a:t>Commands to FRs</a:t>
-            </a:r>
-          </a:p>
-          <a:p>
-            <a:pPr marL="171450" indent="-171450">
-              <a:buFontTx/>
-              <a:buChar char="-"/>
-            </a:pPr>
-            <a:r>
-              <a:rPr lang="en-US" sz="1100" dirty="0" smtClean="0"/>
-              <a:t>Message to Human Coordinator</a:t>
-            </a:r>
-          </a:p>
-          <a:p>
-            <a:pPr marL="171450" indent="-171450">
-              <a:buFontTx/>
-              <a:buChar char="-"/>
-            </a:pPr>
-            <a:r>
-              <a:rPr lang="en-US" sz="1100" dirty="0" smtClean="0"/>
-              <a:t>Accept/Reject to Planner Agent</a:t>
-            </a:r>
-          </a:p>
-          <a:p>
-            <a:pPr marL="171450" indent="-171450">
-              <a:buFontTx/>
-              <a:buChar char="-"/>
-            </a:pPr>
-            <a:endParaRPr lang="en-US" sz="1100" dirty="0" smtClean="0"/>
-          </a:p>
-        </p:txBody>
-      </p:sp>
-      <p:sp>
-        <p:nvSpPr>
-          <p:cNvPr id="59" name="Rounded Rectangle 58"/>
-          <p:cNvSpPr/>
-          <p:nvPr/>
-        </p:nvSpPr>
-        <p:spPr>
-          <a:xfrm>
-            <a:off x="2011712" y="531276"/>
-            <a:ext cx="1637985" cy="1773148"/>
-          </a:xfrm>
-          <a:prstGeom prst="roundRect">
-            <a:avLst>
-              <a:gd name="adj" fmla="val 0"/>
-            </a:avLst>
-          </a:prstGeom>
-          <a:noFill/>
-          <a:ln>
-            <a:solidFill>
-              <a:schemeClr val="tx1"/>
-            </a:solidFill>
-            <a:prstDash val="dot"/>
-          </a:ln>
-          <a:effectLst/>
-        </p:spPr>
-        <p:style>
-          <a:lnRef idx="1">
-            <a:schemeClr val="accent1"/>
-          </a:lnRef>
-          <a:fillRef idx="3">
-            <a:schemeClr val="accent1"/>
-          </a:fillRef>
-          <a:effectRef idx="2">
-            <a:schemeClr val="accent1"/>
-          </a:effectRef>
-          <a:fontRef idx="minor">
-            <a:schemeClr val="lt1"/>
-          </a:fontRef>
-        </p:style>
-        <p:txBody>
-          <a:bodyPr rtlCol="0" anchor="ctr"/>
-          <a:lstStyle/>
-          <a:p>
-            <a:pPr algn="ctr"/>
-            <a:endParaRPr lang="en-US" sz="1200" dirty="0">
-              <a:solidFill>
-                <a:srgbClr val="000000"/>
-              </a:solidFill>
-            </a:endParaRPr>
-          </a:p>
-        </p:txBody>
-      </p:sp>
-      <p:sp>
-        <p:nvSpPr>
-          <p:cNvPr id="60" name="TextBox 59"/>
-          <p:cNvSpPr txBox="1"/>
-          <p:nvPr/>
-        </p:nvSpPr>
-        <p:spPr>
-          <a:xfrm>
-            <a:off x="2011712" y="1235927"/>
-            <a:ext cx="483801" cy="369332"/>
-          </a:xfrm>
-          <a:prstGeom prst="rect">
-            <a:avLst/>
-          </a:prstGeom>
-          <a:noFill/>
-        </p:spPr>
-        <p:txBody>
-          <a:bodyPr wrap="none" rtlCol="0">
-            <a:spAutoFit/>
-          </a:bodyPr>
-          <a:lstStyle/>
-          <a:p>
-            <a:r>
-              <a:rPr lang="en-US" dirty="0" smtClean="0"/>
-              <a:t>HQ</a:t>
-            </a:r>
-            <a:endParaRPr lang="en-US" dirty="0"/>
-          </a:p>
-        </p:txBody>
-      </p:sp>
-      <p:sp>
-        <p:nvSpPr>
-          <p:cNvPr id="61" name="Left Brace 60"/>
-          <p:cNvSpPr/>
-          <p:nvPr/>
-        </p:nvSpPr>
-        <p:spPr>
-          <a:xfrm>
-            <a:off x="3474489" y="479444"/>
-            <a:ext cx="529757" cy="716786"/>
-          </a:xfrm>
-          <a:prstGeom prst="leftBrace">
-            <a:avLst/>
-          </a:prstGeom>
-          <a:ln w="9525" cmpd="sng">
-            <a:solidFill>
-              <a:srgbClr val="000000"/>
-            </a:solidFill>
-          </a:ln>
-          <a:effectLst/>
-        </p:spPr>
-        <p:style>
-          <a:lnRef idx="2">
-            <a:schemeClr val="accent1"/>
-          </a:lnRef>
-          <a:fillRef idx="0">
-            <a:schemeClr val="accent1"/>
-          </a:fillRef>
-          <a:effectRef idx="1">
-            <a:schemeClr val="accent1"/>
-          </a:effectRef>
-          <a:fontRef idx="minor">
-            <a:schemeClr val="tx1"/>
-          </a:fontRef>
-        </p:style>
-        <p:txBody>
-          <a:bodyPr rtlCol="0" anchor="ctr"/>
-          <a:lstStyle/>
-          <a:p>
-            <a:pPr algn="ctr"/>
-            <a:endParaRPr lang="en-US"/>
-          </a:p>
-        </p:txBody>
-      </p:sp>
-      <p:sp>
-        <p:nvSpPr>
-          <p:cNvPr id="62" name="Left Brace 61"/>
-          <p:cNvSpPr/>
-          <p:nvPr/>
-        </p:nvSpPr>
-        <p:spPr>
-          <a:xfrm>
-            <a:off x="3474489" y="1619219"/>
-            <a:ext cx="529757" cy="716786"/>
-          </a:xfrm>
-          <a:prstGeom prst="leftBrace">
-            <a:avLst/>
-          </a:prstGeom>
-          <a:ln w="9525" cmpd="sng">
-            <a:solidFill>
-              <a:srgbClr val="000000"/>
-            </a:solidFill>
-          </a:ln>
-          <a:effectLst/>
-        </p:spPr>
-        <p:style>
-          <a:lnRef idx="2">
-            <a:schemeClr val="accent1"/>
-          </a:lnRef>
-          <a:fillRef idx="0">
-            <a:schemeClr val="accent1"/>
-          </a:fillRef>
-          <a:effectRef idx="1">
-            <a:schemeClr val="accent1"/>
-          </a:effectRef>
-          <a:fontRef idx="minor">
-            <a:schemeClr val="tx1"/>
-          </a:fontRef>
-        </p:style>
-        <p:txBody>
-          <a:bodyPr rtlCol="0" anchor="ctr"/>
-          <a:lstStyle/>
-          <a:p>
-            <a:pPr algn="ctr"/>
-            <a:endParaRPr lang="en-US"/>
-          </a:p>
-        </p:txBody>
-      </p:sp>
-      <p:sp>
-        <p:nvSpPr>
-          <p:cNvPr id="63" name="Left Brace 62"/>
-          <p:cNvSpPr/>
-          <p:nvPr/>
-        </p:nvSpPr>
-        <p:spPr>
-          <a:xfrm>
-            <a:off x="4261864" y="2595766"/>
-            <a:ext cx="529757" cy="716786"/>
-          </a:xfrm>
-          <a:prstGeom prst="leftBrace">
-            <a:avLst/>
-          </a:prstGeom>
-          <a:ln w="9525" cmpd="sng">
-            <a:solidFill>
-              <a:srgbClr val="000000"/>
-            </a:solidFill>
-          </a:ln>
-          <a:effectLst/>
-        </p:spPr>
-        <p:style>
-          <a:lnRef idx="2">
-            <a:schemeClr val="accent1"/>
-          </a:lnRef>
-          <a:fillRef idx="0">
-            <a:schemeClr val="accent1"/>
-          </a:fillRef>
-          <a:effectRef idx="1">
-            <a:schemeClr val="accent1"/>
-          </a:effectRef>
-          <a:fontRef idx="minor">
-            <a:schemeClr val="tx1"/>
-          </a:fontRef>
-        </p:style>
-        <p:txBody>
-          <a:bodyPr rtlCol="0" anchor="ctr"/>
-          <a:lstStyle/>
-          <a:p>
-            <a:pPr algn="ctr"/>
-            <a:endParaRPr lang="en-US"/>
-          </a:p>
-        </p:txBody>
-      </p:sp>
-      <p:cxnSp>
-        <p:nvCxnSpPr>
-          <p:cNvPr id="65" name="Straight Connector 64"/>
-          <p:cNvCxnSpPr/>
-          <p:nvPr/>
-        </p:nvCxnSpPr>
-        <p:spPr>
-          <a:xfrm flipH="1">
-            <a:off x="1906489" y="2951320"/>
-            <a:ext cx="179869" cy="0"/>
-          </a:xfrm>
-          <a:prstGeom prst="line">
-            <a:avLst/>
-          </a:prstGeom>
-          <a:ln>
-            <a:solidFill>
-              <a:schemeClr val="tx1"/>
-            </a:solidFill>
-          </a:ln>
-          <a:effectLst/>
-        </p:spPr>
-        <p:style>
-          <a:lnRef idx="2">
-            <a:schemeClr val="accent1"/>
-          </a:lnRef>
-          <a:fillRef idx="0">
-            <a:schemeClr val="accent1"/>
-          </a:fillRef>
-          <a:effectRef idx="1">
-            <a:schemeClr val="accent1"/>
-          </a:effectRef>
-          <a:fontRef idx="minor">
-            <a:schemeClr val="tx1"/>
-          </a:fontRef>
-        </p:style>
-      </p:cxnSp>
-      <p:cxnSp>
-        <p:nvCxnSpPr>
-          <p:cNvPr id="68" name="Straight Connector 67"/>
-          <p:cNvCxnSpPr/>
-          <p:nvPr/>
-        </p:nvCxnSpPr>
-        <p:spPr>
-          <a:xfrm flipH="1">
-            <a:off x="2581894" y="2951320"/>
-            <a:ext cx="140988" cy="0"/>
-          </a:xfrm>
-          <a:prstGeom prst="line">
-            <a:avLst/>
-          </a:prstGeom>
-          <a:ln>
-            <a:solidFill>
-              <a:schemeClr val="tx1"/>
-            </a:solidFill>
-          </a:ln>
-          <a:effectLst/>
-        </p:spPr>
-        <p:style>
-          <a:lnRef idx="2">
-            <a:schemeClr val="accent1"/>
-          </a:lnRef>
-          <a:fillRef idx="0">
-            <a:schemeClr val="accent1"/>
-          </a:fillRef>
-          <a:effectRef idx="1">
-            <a:schemeClr val="accent1"/>
-          </a:effectRef>
-          <a:fontRef idx="minor">
-            <a:schemeClr val="tx1"/>
-          </a:fontRef>
-        </p:style>
-      </p:cxnSp>
-      <p:cxnSp>
-        <p:nvCxnSpPr>
-          <p:cNvPr id="71" name="Straight Connector 70"/>
-          <p:cNvCxnSpPr>
-            <a:stCxn id="9" idx="1"/>
-            <a:endCxn id="8" idx="3"/>
-          </p:cNvCxnSpPr>
-          <p:nvPr/>
-        </p:nvCxnSpPr>
-        <p:spPr>
-          <a:xfrm flipH="1">
-            <a:off x="3527872" y="2948224"/>
-            <a:ext cx="238456" cy="3096"/>
-          </a:xfrm>
-          <a:prstGeom prst="line">
-            <a:avLst/>
-          </a:prstGeom>
-          <a:ln>
-            <a:solidFill>
-              <a:schemeClr val="tx1"/>
-            </a:solidFill>
-          </a:ln>
-          <a:effectLst/>
-        </p:spPr>
-        <p:style>
-          <a:lnRef idx="2">
-            <a:schemeClr val="accent1"/>
-          </a:lnRef>
-          <a:fillRef idx="0">
-            <a:schemeClr val="accent1"/>
-          </a:fillRef>
-          <a:effectRef idx="1">
-            <a:schemeClr val="accent1"/>
-          </a:effectRef>
-          <a:fontRef idx="minor">
-            <a:schemeClr val="tx1"/>
-          </a:fontRef>
-        </p:style>
-      </p:cxnSp>
-      <p:cxnSp>
-        <p:nvCxnSpPr>
-          <p:cNvPr id="75" name="Straight Connector 74"/>
-          <p:cNvCxnSpPr>
-            <a:stCxn id="8" idx="1"/>
-          </p:cNvCxnSpPr>
-          <p:nvPr/>
-        </p:nvCxnSpPr>
-        <p:spPr>
-          <a:xfrm flipH="1" flipV="1">
-            <a:off x="2863884" y="2948224"/>
-            <a:ext cx="168452" cy="3096"/>
-          </a:xfrm>
-          <a:prstGeom prst="line">
-            <a:avLst/>
-          </a:prstGeom>
-          <a:ln>
-            <a:solidFill>
-              <a:schemeClr val="tx1"/>
-            </a:solidFill>
-          </a:ln>
-          <a:effectLst/>
-        </p:spPr>
-        <p:style>
-          <a:lnRef idx="2">
-            <a:schemeClr val="accent1"/>
-          </a:lnRef>
-          <a:fillRef idx="0">
-            <a:schemeClr val="accent1"/>
-          </a:fillRef>
-          <a:effectRef idx="1">
-            <a:schemeClr val="accent1"/>
-          </a:effectRef>
-          <a:fontRef idx="minor">
-            <a:schemeClr val="tx1"/>
-          </a:fontRef>
-        </p:style>
-      </p:cxnSp>
+            </a:fontRef>
+          </p:style>
+        </p:cxnSp>
+      </p:grpSp>
     </p:spTree>
     <p:extLst>
       <p:ext uri="{BB962C8B-B14F-4D97-AF65-F5344CB8AC3E}">

</xml_diff>

<commit_message>
added a simulation result.
</commit_message>
<xml_diff>
--- a/AAMAS Paper/scenario.pptx
+++ b/AAMAS Paper/scenario.pptx
@@ -6,6 +6,7 @@
   </p:sldMasterIdLst>
   <p:sldIdLst>
     <p:sldId id="256" r:id="rId2"/>
+    <p:sldId id="257" r:id="rId3"/>
   </p:sldIdLst>
   <p:sldSz cx="9144000" cy="6858000" type="screen4x3"/>
   <p:notesSz cx="6858000" cy="9144000"/>
@@ -107,6 +108,250 @@
 </p:presentation>
 </file>
 
+<file path=ppt/charts/chart1.xml><?xml version="1.0" encoding="utf-8"?>
+<c:chartSpace xmlns:c="http://schemas.openxmlformats.org/drawingml/2006/chart" xmlns:a="http://schemas.openxmlformats.org/drawingml/2006/main" xmlns:r="http://schemas.openxmlformats.org/officeDocument/2006/relationships">
+  <c:lang val="en-US"/>
+  <c:style val="1"/>
+  <c:chart>
+    <c:plotArea>
+      <c:layout/>
+      <c:barChart>
+        <c:barDir val="col"/>
+        <c:grouping val="clustered"/>
+        <c:ser>
+          <c:idx val="0"/>
+          <c:order val="0"/>
+          <c:tx>
+            <c:strRef>
+              <c:f>Sheet1!$B$1</c:f>
+              <c:strCache>
+                <c:ptCount val="1"/>
+                <c:pt idx="0">
+                  <c:v>Completed Tasks</c:v>
+                </c:pt>
+              </c:strCache>
+            </c:strRef>
+          </c:tx>
+          <c:spPr>
+            <a:ln>
+              <a:solidFill>
+                <a:prstClr val="black"/>
+              </a:solidFill>
+            </a:ln>
+          </c:spPr>
+          <c:dLbls>
+            <c:numFmt formatCode="0%" sourceLinked="0"/>
+            <c:dLblPos val="outEnd"/>
+            <c:showVal val="1"/>
+          </c:dLbls>
+          <c:cat>
+            <c:strRef>
+              <c:f>Sheet1!$A$2:$A$4</c:f>
+              <c:strCache>
+                <c:ptCount val="3"/>
+                <c:pt idx="0">
+                  <c:v>MMDP</c:v>
+                </c:pt>
+                <c:pt idx="1">
+                  <c:v>Myopic</c:v>
+                </c:pt>
+                <c:pt idx="2">
+                  <c:v>Greedy</c:v>
+                </c:pt>
+              </c:strCache>
+            </c:strRef>
+          </c:cat>
+          <c:val>
+            <c:numRef>
+              <c:f>Sheet1!$B$2:$B$4</c:f>
+              <c:numCache>
+                <c:formatCode>0.00%</c:formatCode>
+                <c:ptCount val="3"/>
+                <c:pt idx="0">
+                  <c:v>0.71000000000000008</c:v>
+                </c:pt>
+                <c:pt idx="1">
+                  <c:v>0.65000000000000013</c:v>
+                </c:pt>
+                <c:pt idx="2">
+                  <c:v>0.41000000000000003</c:v>
+                </c:pt>
+              </c:numCache>
+            </c:numRef>
+          </c:val>
+        </c:ser>
+        <c:ser>
+          <c:idx val="1"/>
+          <c:order val="1"/>
+          <c:tx>
+            <c:strRef>
+              <c:f>Sheet1!$C$1</c:f>
+              <c:strCache>
+                <c:ptCount val="1"/>
+                <c:pt idx="0">
+                  <c:v>Survived Responders</c:v>
+                </c:pt>
+              </c:strCache>
+            </c:strRef>
+          </c:tx>
+          <c:spPr>
+            <a:ln>
+              <a:solidFill>
+                <a:schemeClr val="tx1"/>
+              </a:solidFill>
+            </a:ln>
+          </c:spPr>
+          <c:invertIfNegative val="1"/>
+          <c:dPt>
+            <c:idx val="0"/>
+            <c:invertIfNegative val="1"/>
+            <c:spPr>
+              <a:ln>
+                <a:solidFill>
+                  <a:schemeClr val="tx1"/>
+                </a:solidFill>
+              </a:ln>
+            </c:spPr>
+          </c:dPt>
+          <c:dLbls>
+            <c:dLbl>
+              <c:idx val="0"/>
+              <c:layout/>
+              <c:tx>
+                <c:rich>
+                  <a:bodyPr/>
+                  <a:lstStyle/>
+                  <a:p>
+                    <a:pPr>
+                      <a:defRPr/>
+                    </a:pPr>
+                    <a:r>
+                      <a:rPr lang="en-US"/>
+                      <a:t>100%</a:t>
+                    </a:r>
+                  </a:p>
+                </c:rich>
+              </c:tx>
+              <c:numFmt formatCode="0%" sourceLinked="0"/>
+              <c:spPr/>
+              <c:dLblPos val="outEnd"/>
+              <c:showVal val="1"/>
+            </c:dLbl>
+            <c:numFmt formatCode="0%" sourceLinked="0"/>
+            <c:dLblPos val="outEnd"/>
+            <c:showVal val="1"/>
+          </c:dLbls>
+          <c:cat>
+            <c:strRef>
+              <c:f>Sheet1!$A$2:$A$4</c:f>
+              <c:strCache>
+                <c:ptCount val="3"/>
+                <c:pt idx="0">
+                  <c:v>MMDP</c:v>
+                </c:pt>
+                <c:pt idx="1">
+                  <c:v>Myopic</c:v>
+                </c:pt>
+                <c:pt idx="2">
+                  <c:v>Greedy</c:v>
+                </c:pt>
+              </c:strCache>
+            </c:strRef>
+          </c:cat>
+          <c:val>
+            <c:numRef>
+              <c:f>Sheet1!$C$2:$C$4</c:f>
+              <c:numCache>
+                <c:formatCode>0%</c:formatCode>
+                <c:ptCount val="3"/>
+                <c:pt idx="0">
+                  <c:v>1</c:v>
+                </c:pt>
+                <c:pt idx="1">
+                  <c:v>0.25</c:v>
+                </c:pt>
+                <c:pt idx="2">
+                  <c:v>0</c:v>
+                </c:pt>
+              </c:numCache>
+            </c:numRef>
+          </c:val>
+        </c:ser>
+        <c:dLbls>
+          <c:showVal val="1"/>
+        </c:dLbls>
+        <c:axId val="133581440"/>
+        <c:axId val="133591424"/>
+      </c:barChart>
+      <c:catAx>
+        <c:axId val="133581440"/>
+        <c:scaling>
+          <c:orientation val="minMax"/>
+        </c:scaling>
+        <c:axPos val="b"/>
+        <c:tickLblPos val="nextTo"/>
+        <c:spPr>
+          <a:ln>
+            <a:solidFill>
+              <a:prstClr val="black"/>
+            </a:solidFill>
+          </a:ln>
+        </c:spPr>
+        <c:crossAx val="133591424"/>
+        <c:crosses val="autoZero"/>
+        <c:auto val="1"/>
+        <c:lblAlgn val="ctr"/>
+        <c:lblOffset val="100"/>
+      </c:catAx>
+      <c:valAx>
+        <c:axId val="133591424"/>
+        <c:scaling>
+          <c:orientation val="minMax"/>
+          <c:max val="1.05"/>
+          <c:min val="0"/>
+        </c:scaling>
+        <c:axPos val="l"/>
+        <c:numFmt formatCode="0%" sourceLinked="0"/>
+        <c:tickLblPos val="nextTo"/>
+        <c:spPr>
+          <a:ln w="9525">
+            <a:solidFill>
+              <a:schemeClr val="tx1"/>
+            </a:solidFill>
+          </a:ln>
+        </c:spPr>
+        <c:crossAx val="133581440"/>
+        <c:crosses val="autoZero"/>
+        <c:crossBetween val="between"/>
+      </c:valAx>
+    </c:plotArea>
+    <c:legend>
+      <c:legendPos val="b"/>
+      <c:layout/>
+      <c:spPr>
+        <a:ln>
+          <a:solidFill>
+            <a:schemeClr val="tx1"/>
+          </a:solidFill>
+        </a:ln>
+      </c:spPr>
+    </c:legend>
+    <c:plotVisOnly val="1"/>
+  </c:chart>
+  <c:txPr>
+    <a:bodyPr/>
+    <a:lstStyle/>
+    <a:p>
+      <a:pPr>
+        <a:defRPr sz="2000" b="1" i="0" baseline="0"/>
+      </a:pPr>
+      <a:endParaRPr lang="en-US"/>
+    </a:p>
+  </c:txPr>
+  <c:externalData r:id="rId1"/>
+</c:chartSpace>
+</file>
+
 <file path=ppt/slideLayouts/slideLayout1.xml><?xml version="1.0" encoding="utf-8"?>
 <p:sldLayout xmlns:a="http://schemas.openxmlformats.org/drawingml/2006/main" xmlns:r="http://schemas.openxmlformats.org/officeDocument/2006/relationships" xmlns:p="http://schemas.openxmlformats.org/presentationml/2006/main" type="title" preserve="1">
   <p:cSld name="Title Slide">
@@ -288,7 +533,8 @@
           <a:p>
             <a:fld id="{66F571F4-AEAC-D748-85A7-4D3EF3412E8C}" type="datetimeFigureOut">
               <a:rPr lang="en-US" smtClean="0"/>
-              <a:t>04/10/2013</a:t>
+              <a:pPr/>
+              <a:t>10/8/2013</a:t>
             </a:fld>
             <a:endParaRPr lang="en-US"/>
           </a:p>
@@ -330,6 +576,7 @@
           <a:p>
             <a:fld id="{C08F63F7-D598-C740-9886-8C47A7459B25}" type="slidenum">
               <a:rPr lang="en-US" smtClean="0"/>
+              <a:pPr/>
               <a:t>‹#›</a:t>
             </a:fld>
             <a:endParaRPr lang="en-US"/>
@@ -339,7 +586,7 @@
     </p:spTree>
     <p:extLst>
       <p:ext uri="{BB962C8B-B14F-4D97-AF65-F5344CB8AC3E}">
-        <p14:creationId xmlns:p14="http://schemas.microsoft.com/office/powerpoint/2010/main" val="1672782962"/>
+        <p14:creationId xmlns="" xmlns:p14="http://schemas.microsoft.com/office/powerpoint/2010/main" val="1672782962"/>
       </p:ext>
     </p:extLst>
   </p:cSld>
@@ -458,7 +705,8 @@
           <a:p>
             <a:fld id="{66F571F4-AEAC-D748-85A7-4D3EF3412E8C}" type="datetimeFigureOut">
               <a:rPr lang="en-US" smtClean="0"/>
-              <a:t>04/10/2013</a:t>
+              <a:pPr/>
+              <a:t>10/8/2013</a:t>
             </a:fld>
             <a:endParaRPr lang="en-US"/>
           </a:p>
@@ -500,6 +748,7 @@
           <a:p>
             <a:fld id="{C08F63F7-D598-C740-9886-8C47A7459B25}" type="slidenum">
               <a:rPr lang="en-US" smtClean="0"/>
+              <a:pPr/>
               <a:t>‹#›</a:t>
             </a:fld>
             <a:endParaRPr lang="en-US"/>
@@ -509,7 +758,7 @@
     </p:spTree>
     <p:extLst>
       <p:ext uri="{BB962C8B-B14F-4D97-AF65-F5344CB8AC3E}">
-        <p14:creationId xmlns:p14="http://schemas.microsoft.com/office/powerpoint/2010/main" val="621913846"/>
+        <p14:creationId xmlns="" xmlns:p14="http://schemas.microsoft.com/office/powerpoint/2010/main" val="621913846"/>
       </p:ext>
     </p:extLst>
   </p:cSld>
@@ -638,7 +887,8 @@
           <a:p>
             <a:fld id="{66F571F4-AEAC-D748-85A7-4D3EF3412E8C}" type="datetimeFigureOut">
               <a:rPr lang="en-US" smtClean="0"/>
-              <a:t>04/10/2013</a:t>
+              <a:pPr/>
+              <a:t>10/8/2013</a:t>
             </a:fld>
             <a:endParaRPr lang="en-US"/>
           </a:p>
@@ -680,6 +930,7 @@
           <a:p>
             <a:fld id="{C08F63F7-D598-C740-9886-8C47A7459B25}" type="slidenum">
               <a:rPr lang="en-US" smtClean="0"/>
+              <a:pPr/>
               <a:t>‹#›</a:t>
             </a:fld>
             <a:endParaRPr lang="en-US"/>
@@ -689,7 +940,7 @@
     </p:spTree>
     <p:extLst>
       <p:ext uri="{BB962C8B-B14F-4D97-AF65-F5344CB8AC3E}">
-        <p14:creationId xmlns:p14="http://schemas.microsoft.com/office/powerpoint/2010/main" val="3115922000"/>
+        <p14:creationId xmlns="" xmlns:p14="http://schemas.microsoft.com/office/powerpoint/2010/main" val="3115922000"/>
       </p:ext>
     </p:extLst>
   </p:cSld>
@@ -808,7 +1059,8 @@
           <a:p>
             <a:fld id="{66F571F4-AEAC-D748-85A7-4D3EF3412E8C}" type="datetimeFigureOut">
               <a:rPr lang="en-US" smtClean="0"/>
-              <a:t>04/10/2013</a:t>
+              <a:pPr/>
+              <a:t>10/8/2013</a:t>
             </a:fld>
             <a:endParaRPr lang="en-US"/>
           </a:p>
@@ -850,6 +1102,7 @@
           <a:p>
             <a:fld id="{C08F63F7-D598-C740-9886-8C47A7459B25}" type="slidenum">
               <a:rPr lang="en-US" smtClean="0"/>
+              <a:pPr/>
               <a:t>‹#›</a:t>
             </a:fld>
             <a:endParaRPr lang="en-US"/>
@@ -859,7 +1112,7 @@
     </p:spTree>
     <p:extLst>
       <p:ext uri="{BB962C8B-B14F-4D97-AF65-F5344CB8AC3E}">
-        <p14:creationId xmlns:p14="http://schemas.microsoft.com/office/powerpoint/2010/main" val="2189818206"/>
+        <p14:creationId xmlns="" xmlns:p14="http://schemas.microsoft.com/office/powerpoint/2010/main" val="2189818206"/>
       </p:ext>
     </p:extLst>
   </p:cSld>
@@ -1054,7 +1307,8 @@
           <a:p>
             <a:fld id="{66F571F4-AEAC-D748-85A7-4D3EF3412E8C}" type="datetimeFigureOut">
               <a:rPr lang="en-US" smtClean="0"/>
-              <a:t>04/10/2013</a:t>
+              <a:pPr/>
+              <a:t>10/8/2013</a:t>
             </a:fld>
             <a:endParaRPr lang="en-US"/>
           </a:p>
@@ -1096,6 +1350,7 @@
           <a:p>
             <a:fld id="{C08F63F7-D598-C740-9886-8C47A7459B25}" type="slidenum">
               <a:rPr lang="en-US" smtClean="0"/>
+              <a:pPr/>
               <a:t>‹#›</a:t>
             </a:fld>
             <a:endParaRPr lang="en-US"/>
@@ -1105,7 +1360,7 @@
     </p:spTree>
     <p:extLst>
       <p:ext uri="{BB962C8B-B14F-4D97-AF65-F5344CB8AC3E}">
-        <p14:creationId xmlns:p14="http://schemas.microsoft.com/office/powerpoint/2010/main" val="286717306"/>
+        <p14:creationId xmlns="" xmlns:p14="http://schemas.microsoft.com/office/powerpoint/2010/main" val="286717306"/>
       </p:ext>
     </p:extLst>
   </p:cSld>
@@ -1342,7 +1597,8 @@
           <a:p>
             <a:fld id="{66F571F4-AEAC-D748-85A7-4D3EF3412E8C}" type="datetimeFigureOut">
               <a:rPr lang="en-US" smtClean="0"/>
-              <a:t>04/10/2013</a:t>
+              <a:pPr/>
+              <a:t>10/8/2013</a:t>
             </a:fld>
             <a:endParaRPr lang="en-US"/>
           </a:p>
@@ -1384,6 +1640,7 @@
           <a:p>
             <a:fld id="{C08F63F7-D598-C740-9886-8C47A7459B25}" type="slidenum">
               <a:rPr lang="en-US" smtClean="0"/>
+              <a:pPr/>
               <a:t>‹#›</a:t>
             </a:fld>
             <a:endParaRPr lang="en-US"/>
@@ -1393,7 +1650,7 @@
     </p:spTree>
     <p:extLst>
       <p:ext uri="{BB962C8B-B14F-4D97-AF65-F5344CB8AC3E}">
-        <p14:creationId xmlns:p14="http://schemas.microsoft.com/office/powerpoint/2010/main" val="2021888936"/>
+        <p14:creationId xmlns="" xmlns:p14="http://schemas.microsoft.com/office/powerpoint/2010/main" val="2021888936"/>
       </p:ext>
     </p:extLst>
   </p:cSld>
@@ -1764,7 +2021,8 @@
           <a:p>
             <a:fld id="{66F571F4-AEAC-D748-85A7-4D3EF3412E8C}" type="datetimeFigureOut">
               <a:rPr lang="en-US" smtClean="0"/>
-              <a:t>04/10/2013</a:t>
+              <a:pPr/>
+              <a:t>10/8/2013</a:t>
             </a:fld>
             <a:endParaRPr lang="en-US"/>
           </a:p>
@@ -1806,6 +2064,7 @@
           <a:p>
             <a:fld id="{C08F63F7-D598-C740-9886-8C47A7459B25}" type="slidenum">
               <a:rPr lang="en-US" smtClean="0"/>
+              <a:pPr/>
               <a:t>‹#›</a:t>
             </a:fld>
             <a:endParaRPr lang="en-US"/>
@@ -1815,7 +2074,7 @@
     </p:spTree>
     <p:extLst>
       <p:ext uri="{BB962C8B-B14F-4D97-AF65-F5344CB8AC3E}">
-        <p14:creationId xmlns:p14="http://schemas.microsoft.com/office/powerpoint/2010/main" val="1888262430"/>
+        <p14:creationId xmlns="" xmlns:p14="http://schemas.microsoft.com/office/powerpoint/2010/main" val="1888262430"/>
       </p:ext>
     </p:extLst>
   </p:cSld>
@@ -1882,7 +2141,8 @@
           <a:p>
             <a:fld id="{66F571F4-AEAC-D748-85A7-4D3EF3412E8C}" type="datetimeFigureOut">
               <a:rPr lang="en-US" smtClean="0"/>
-              <a:t>04/10/2013</a:t>
+              <a:pPr/>
+              <a:t>10/8/2013</a:t>
             </a:fld>
             <a:endParaRPr lang="en-US"/>
           </a:p>
@@ -1924,6 +2184,7 @@
           <a:p>
             <a:fld id="{C08F63F7-D598-C740-9886-8C47A7459B25}" type="slidenum">
               <a:rPr lang="en-US" smtClean="0"/>
+              <a:pPr/>
               <a:t>‹#›</a:t>
             </a:fld>
             <a:endParaRPr lang="en-US"/>
@@ -1933,7 +2194,7 @@
     </p:spTree>
     <p:extLst>
       <p:ext uri="{BB962C8B-B14F-4D97-AF65-F5344CB8AC3E}">
-        <p14:creationId xmlns:p14="http://schemas.microsoft.com/office/powerpoint/2010/main" val="1903971878"/>
+        <p14:creationId xmlns="" xmlns:p14="http://schemas.microsoft.com/office/powerpoint/2010/main" val="1903971878"/>
       </p:ext>
     </p:extLst>
   </p:cSld>
@@ -1977,7 +2238,8 @@
           <a:p>
             <a:fld id="{66F571F4-AEAC-D748-85A7-4D3EF3412E8C}" type="datetimeFigureOut">
               <a:rPr lang="en-US" smtClean="0"/>
-              <a:t>04/10/2013</a:t>
+              <a:pPr/>
+              <a:t>10/8/2013</a:t>
             </a:fld>
             <a:endParaRPr lang="en-US"/>
           </a:p>
@@ -2019,6 +2281,7 @@
           <a:p>
             <a:fld id="{C08F63F7-D598-C740-9886-8C47A7459B25}" type="slidenum">
               <a:rPr lang="en-US" smtClean="0"/>
+              <a:pPr/>
               <a:t>‹#›</a:t>
             </a:fld>
             <a:endParaRPr lang="en-US"/>
@@ -2028,7 +2291,7 @@
     </p:spTree>
     <p:extLst>
       <p:ext uri="{BB962C8B-B14F-4D97-AF65-F5344CB8AC3E}">
-        <p14:creationId xmlns:p14="http://schemas.microsoft.com/office/powerpoint/2010/main" val="2230354588"/>
+        <p14:creationId xmlns="" xmlns:p14="http://schemas.microsoft.com/office/powerpoint/2010/main" val="2230354588"/>
       </p:ext>
     </p:extLst>
   </p:cSld>
@@ -2254,7 +2517,8 @@
           <a:p>
             <a:fld id="{66F571F4-AEAC-D748-85A7-4D3EF3412E8C}" type="datetimeFigureOut">
               <a:rPr lang="en-US" smtClean="0"/>
-              <a:t>04/10/2013</a:t>
+              <a:pPr/>
+              <a:t>10/8/2013</a:t>
             </a:fld>
             <a:endParaRPr lang="en-US"/>
           </a:p>
@@ -2296,6 +2560,7 @@
           <a:p>
             <a:fld id="{C08F63F7-D598-C740-9886-8C47A7459B25}" type="slidenum">
               <a:rPr lang="en-US" smtClean="0"/>
+              <a:pPr/>
               <a:t>‹#›</a:t>
             </a:fld>
             <a:endParaRPr lang="en-US"/>
@@ -2305,7 +2570,7 @@
     </p:spTree>
     <p:extLst>
       <p:ext uri="{BB962C8B-B14F-4D97-AF65-F5344CB8AC3E}">
-        <p14:creationId xmlns:p14="http://schemas.microsoft.com/office/powerpoint/2010/main" val="726958488"/>
+        <p14:creationId xmlns="" xmlns:p14="http://schemas.microsoft.com/office/powerpoint/2010/main" val="726958488"/>
       </p:ext>
     </p:extLst>
   </p:cSld>
@@ -2507,7 +2772,8 @@
           <a:p>
             <a:fld id="{66F571F4-AEAC-D748-85A7-4D3EF3412E8C}" type="datetimeFigureOut">
               <a:rPr lang="en-US" smtClean="0"/>
-              <a:t>04/10/2013</a:t>
+              <a:pPr/>
+              <a:t>10/8/2013</a:t>
             </a:fld>
             <a:endParaRPr lang="en-US"/>
           </a:p>
@@ -2549,6 +2815,7 @@
           <a:p>
             <a:fld id="{C08F63F7-D598-C740-9886-8C47A7459B25}" type="slidenum">
               <a:rPr lang="en-US" smtClean="0"/>
+              <a:pPr/>
               <a:t>‹#›</a:t>
             </a:fld>
             <a:endParaRPr lang="en-US"/>
@@ -2558,7 +2825,7 @@
     </p:spTree>
     <p:extLst>
       <p:ext uri="{BB962C8B-B14F-4D97-AF65-F5344CB8AC3E}">
-        <p14:creationId xmlns:p14="http://schemas.microsoft.com/office/powerpoint/2010/main" val="38659779"/>
+        <p14:creationId xmlns="" xmlns:p14="http://schemas.microsoft.com/office/powerpoint/2010/main" val="38659779"/>
       </p:ext>
     </p:extLst>
   </p:cSld>
@@ -2720,7 +2987,8 @@
           <a:p>
             <a:fld id="{66F571F4-AEAC-D748-85A7-4D3EF3412E8C}" type="datetimeFigureOut">
               <a:rPr lang="en-US" smtClean="0"/>
-              <a:t>04/10/2013</a:t>
+              <a:pPr/>
+              <a:t>10/8/2013</a:t>
             </a:fld>
             <a:endParaRPr lang="en-US"/>
           </a:p>
@@ -2798,6 +3066,7 @@
           <a:p>
             <a:fld id="{C08F63F7-D598-C740-9886-8C47A7459B25}" type="slidenum">
               <a:rPr lang="en-US" smtClean="0"/>
+              <a:pPr/>
               <a:t>‹#›</a:t>
             </a:fld>
             <a:endParaRPr lang="en-US"/>
@@ -2807,7 +3076,7 @@
     </p:spTree>
     <p:extLst>
       <p:ext uri="{BB962C8B-B14F-4D97-AF65-F5344CB8AC3E}">
-        <p14:creationId xmlns:p14="http://schemas.microsoft.com/office/powerpoint/2010/main" val="1254848123"/>
+        <p14:creationId xmlns="" xmlns:p14="http://schemas.microsoft.com/office/powerpoint/2010/main" val="1254848123"/>
       </p:ext>
     </p:extLst>
   </p:cSld>
@@ -3885,7 +4154,6 @@
                 <a:rPr lang="en-US" sz="1100" dirty="0" smtClean="0"/>
                 <a:t>Gets point radiation level</a:t>
               </a:r>
-              <a:endParaRPr lang="en-US" sz="1100" dirty="0" smtClean="0"/>
             </a:p>
             <a:p>
               <a:pPr marL="171450" indent="-171450">
@@ -4293,9 +4561,50 @@
     </p:spTree>
     <p:extLst>
       <p:ext uri="{BB962C8B-B14F-4D97-AF65-F5344CB8AC3E}">
-        <p14:creationId xmlns:p14="http://schemas.microsoft.com/office/powerpoint/2010/main" val="1513028340"/>
+        <p14:creationId xmlns="" xmlns:p14="http://schemas.microsoft.com/office/powerpoint/2010/main" val="1513028340"/>
       </p:ext>
     </p:extLst>
+  </p:cSld>
+  <p:clrMapOvr>
+    <a:masterClrMapping/>
+  </p:clrMapOvr>
+</p:sld>
+</file>
+
+<file path=ppt/slides/slide2.xml><?xml version="1.0" encoding="utf-8"?>
+<p:sld xmlns:a="http://schemas.openxmlformats.org/drawingml/2006/main" xmlns:r="http://schemas.openxmlformats.org/officeDocument/2006/relationships" xmlns:p="http://schemas.openxmlformats.org/presentationml/2006/main">
+  <p:cSld>
+    <p:spTree>
+      <p:nvGrpSpPr>
+        <p:cNvPr id="1" name=""/>
+        <p:cNvGrpSpPr/>
+        <p:nvPr/>
+      </p:nvGrpSpPr>
+      <p:grpSpPr>
+        <a:xfrm>
+          <a:off x="0" y="0"/>
+          <a:ext cx="0" cy="0"/>
+          <a:chOff x="0" y="0"/>
+          <a:chExt cx="0" cy="0"/>
+        </a:xfrm>
+      </p:grpSpPr>
+      <p:graphicFrame>
+        <p:nvGraphicFramePr>
+          <p:cNvPr id="4" name="图表 3"/>
+          <p:cNvGraphicFramePr/>
+          <p:nvPr/>
+        </p:nvGraphicFramePr>
+        <p:xfrm>
+          <a:off x="0" y="0"/>
+          <a:ext cx="9144000" cy="6858000"/>
+        </p:xfrm>
+        <a:graphic>
+          <a:graphicData uri="http://schemas.openxmlformats.org/drawingml/2006/chart">
+            <c:chart xmlns:c="http://schemas.openxmlformats.org/drawingml/2006/chart" xmlns:r="http://schemas.openxmlformats.org/officeDocument/2006/relationships" r:id="rId2"/>
+          </a:graphicData>
+        </a:graphic>
+      </p:graphicFrame>
+    </p:spTree>
   </p:cSld>
   <p:clrMapOvr>
     <a:masterClrMapping/>

</xml_diff>